<commit_message>
Net Documentation update, #22 #16
</commit_message>
<xml_diff>
--- a/docs/XPMP2 Remote Architecture.pptx
+++ b/docs/XPMP2 Remote Architecture.pptx
@@ -8,6 +8,8 @@
     <p:sldId id="256" r:id="rId2"/>
     <p:sldId id="259" r:id="rId3"/>
     <p:sldId id="257" r:id="rId4"/>
+    <p:sldId id="260" r:id="rId5"/>
+    <p:sldId id="261" r:id="rId6"/>
   </p:sldIdLst>
   <p:sldSz cx="12192000" cy="6858000"/>
   <p:notesSz cx="6858000" cy="9144000"/>
@@ -274,7 +276,7 @@
           <a:p>
             <a:fld id="{10EC4C2E-EC84-AC41-A50A-0694F464D93B}" type="datetimeFigureOut">
               <a:rPr lang="de-DE" smtClean="0"/>
-              <a:t>14.11.20</a:t>
+              <a:t>18.11.20</a:t>
             </a:fld>
             <a:endParaRPr lang="de-DE"/>
           </a:p>
@@ -474,7 +476,7 @@
           <a:p>
             <a:fld id="{10EC4C2E-EC84-AC41-A50A-0694F464D93B}" type="datetimeFigureOut">
               <a:rPr lang="de-DE" smtClean="0"/>
-              <a:t>14.11.20</a:t>
+              <a:t>18.11.20</a:t>
             </a:fld>
             <a:endParaRPr lang="de-DE"/>
           </a:p>
@@ -684,7 +686,7 @@
           <a:p>
             <a:fld id="{10EC4C2E-EC84-AC41-A50A-0694F464D93B}" type="datetimeFigureOut">
               <a:rPr lang="de-DE" smtClean="0"/>
-              <a:t>14.11.20</a:t>
+              <a:t>18.11.20</a:t>
             </a:fld>
             <a:endParaRPr lang="de-DE"/>
           </a:p>
@@ -884,7 +886,7 @@
           <a:p>
             <a:fld id="{10EC4C2E-EC84-AC41-A50A-0694F464D93B}" type="datetimeFigureOut">
               <a:rPr lang="de-DE" smtClean="0"/>
-              <a:t>14.11.20</a:t>
+              <a:t>18.11.20</a:t>
             </a:fld>
             <a:endParaRPr lang="de-DE"/>
           </a:p>
@@ -1160,7 +1162,7 @@
           <a:p>
             <a:fld id="{10EC4C2E-EC84-AC41-A50A-0694F464D93B}" type="datetimeFigureOut">
               <a:rPr lang="de-DE" smtClean="0"/>
-              <a:t>14.11.20</a:t>
+              <a:t>18.11.20</a:t>
             </a:fld>
             <a:endParaRPr lang="de-DE"/>
           </a:p>
@@ -1428,7 +1430,7 @@
           <a:p>
             <a:fld id="{10EC4C2E-EC84-AC41-A50A-0694F464D93B}" type="datetimeFigureOut">
               <a:rPr lang="de-DE" smtClean="0"/>
-              <a:t>14.11.20</a:t>
+              <a:t>18.11.20</a:t>
             </a:fld>
             <a:endParaRPr lang="de-DE"/>
           </a:p>
@@ -1843,7 +1845,7 @@
           <a:p>
             <a:fld id="{10EC4C2E-EC84-AC41-A50A-0694F464D93B}" type="datetimeFigureOut">
               <a:rPr lang="de-DE" smtClean="0"/>
-              <a:t>14.11.20</a:t>
+              <a:t>18.11.20</a:t>
             </a:fld>
             <a:endParaRPr lang="de-DE"/>
           </a:p>
@@ -1985,7 +1987,7 @@
           <a:p>
             <a:fld id="{10EC4C2E-EC84-AC41-A50A-0694F464D93B}" type="datetimeFigureOut">
               <a:rPr lang="de-DE" smtClean="0"/>
-              <a:t>14.11.20</a:t>
+              <a:t>18.11.20</a:t>
             </a:fld>
             <a:endParaRPr lang="de-DE"/>
           </a:p>
@@ -2098,7 +2100,7 @@
           <a:p>
             <a:fld id="{10EC4C2E-EC84-AC41-A50A-0694F464D93B}" type="datetimeFigureOut">
               <a:rPr lang="de-DE" smtClean="0"/>
-              <a:t>14.11.20</a:t>
+              <a:t>18.11.20</a:t>
             </a:fld>
             <a:endParaRPr lang="de-DE"/>
           </a:p>
@@ -2411,7 +2413,7 @@
           <a:p>
             <a:fld id="{10EC4C2E-EC84-AC41-A50A-0694F464D93B}" type="datetimeFigureOut">
               <a:rPr lang="de-DE" smtClean="0"/>
-              <a:t>14.11.20</a:t>
+              <a:t>18.11.20</a:t>
             </a:fld>
             <a:endParaRPr lang="de-DE"/>
           </a:p>
@@ -2700,7 +2702,7 @@
           <a:p>
             <a:fld id="{10EC4C2E-EC84-AC41-A50A-0694F464D93B}" type="datetimeFigureOut">
               <a:rPr lang="de-DE" smtClean="0"/>
-              <a:t>14.11.20</a:t>
+              <a:t>18.11.20</a:t>
             </a:fld>
             <a:endParaRPr lang="de-DE"/>
           </a:p>
@@ -2943,7 +2945,7 @@
           <a:p>
             <a:fld id="{10EC4C2E-EC84-AC41-A50A-0694F464D93B}" type="datetimeFigureOut">
               <a:rPr lang="de-DE" smtClean="0"/>
-              <a:t>14.11.20</a:t>
+              <a:t>18.11.20</a:t>
             </a:fld>
             <a:endParaRPr lang="de-DE"/>
           </a:p>
@@ -13101,10 +13103,10 @@
       </p:pic>
       <p:sp>
         <p:nvSpPr>
-          <p:cNvPr id="47" name="TextBox 46">
-            <a:extLst>
-              <a:ext uri="{FF2B5EF4-FFF2-40B4-BE49-F238E27FC236}">
-                <a16:creationId xmlns:a16="http://schemas.microsoft.com/office/drawing/2014/main" id="{6A7A2781-05DA-E74F-9520-B56B5AEDB08A}"/>
+          <p:cNvPr id="48" name="TextBox 47">
+            <a:extLst>
+              <a:ext uri="{FF2B5EF4-FFF2-40B4-BE49-F238E27FC236}">
+                <a16:creationId xmlns:a16="http://schemas.microsoft.com/office/drawing/2014/main" id="{F5F48B14-1514-6549-9C41-88C3B955D0DA}"/>
               </a:ext>
             </a:extLst>
           </p:cNvPr>
@@ -13113,55 +13115,18 @@
         </p:nvSpPr>
         <p:spPr>
           <a:xfrm>
-            <a:off x="4811205" y="3662563"/>
+            <a:off x="4716267" y="3672286"/>
             <a:ext cx="1010093" cy="646331"/>
           </a:xfrm>
           <a:prstGeom prst="rect">
             <a:avLst/>
           </a:prstGeom>
           <a:noFill/>
-        </p:spPr>
-        <p:txBody>
-          <a:bodyPr wrap="square" rtlCol="0">
-            <a:spAutoFit/>
-          </a:bodyPr>
-          <a:lstStyle/>
-          <a:p>
-            <a:pPr algn="ctr"/>
-            <a:r>
-              <a:rPr lang="de-DE" dirty="0">
-                <a:solidFill>
-                  <a:schemeClr val="bg1"/>
-                </a:solidFill>
-                <a:latin typeface="Futura Medium" panose="020B0602020204020303" pitchFamily="34" charset="-79"/>
-                <a:cs typeface="Futura Medium" panose="020B0602020204020303" pitchFamily="34" charset="-79"/>
-              </a:rPr>
-              <a:t>Remote Client</a:t>
-            </a:r>
-          </a:p>
-        </p:txBody>
-      </p:sp>
-      <p:sp>
-        <p:nvSpPr>
-          <p:cNvPr id="48" name="TextBox 47">
-            <a:extLst>
-              <a:ext uri="{FF2B5EF4-FFF2-40B4-BE49-F238E27FC236}">
-                <a16:creationId xmlns:a16="http://schemas.microsoft.com/office/drawing/2014/main" id="{F5F48B14-1514-6549-9C41-88C3B955D0DA}"/>
-              </a:ext>
-            </a:extLst>
-          </p:cNvPr>
-          <p:cNvSpPr txBox="1"/>
-          <p:nvPr/>
-        </p:nvSpPr>
-        <p:spPr>
-          <a:xfrm>
-            <a:off x="4795284" y="3651191"/>
-            <a:ext cx="1010093" cy="646331"/>
-          </a:xfrm>
-          <a:prstGeom prst="rect">
-            <a:avLst/>
-          </a:prstGeom>
-          <a:noFill/>
+          <a:effectLst>
+            <a:outerShdw dist="25400" dir="5400000" algn="ctr" rotWithShape="0">
+              <a:schemeClr val="bg1"/>
+            </a:outerShdw>
+          </a:effectLst>
         </p:spPr>
         <p:txBody>
           <a:bodyPr wrap="square" rtlCol="0">
@@ -13540,6 +13505,2414 @@
     <p:extLst>
       <p:ext uri="{BB962C8B-B14F-4D97-AF65-F5344CB8AC3E}">
         <p14:creationId xmlns:p14="http://schemas.microsoft.com/office/powerpoint/2010/main" val="822513609"/>
+      </p:ext>
+    </p:extLst>
+  </p:cSld>
+  <p:clrMapOvr>
+    <a:masterClrMapping/>
+  </p:clrMapOvr>
+</p:sld>
+</file>
+
+<file path=ppt/slides/slide4.xml><?xml version="1.0" encoding="utf-8"?>
+<p:sld xmlns:a="http://schemas.openxmlformats.org/drawingml/2006/main" xmlns:r="http://schemas.openxmlformats.org/officeDocument/2006/relationships" xmlns:p="http://schemas.openxmlformats.org/presentationml/2006/main">
+  <p:cSld>
+    <p:spTree>
+      <p:nvGrpSpPr>
+        <p:cNvPr id="1" name=""/>
+        <p:cNvGrpSpPr/>
+        <p:nvPr/>
+      </p:nvGrpSpPr>
+      <p:grpSpPr>
+        <a:xfrm>
+          <a:off x="0" y="0"/>
+          <a:ext cx="0" cy="0"/>
+          <a:chOff x="0" y="0"/>
+          <a:chExt cx="0" cy="0"/>
+        </a:xfrm>
+      </p:grpSpPr>
+      <p:pic>
+        <p:nvPicPr>
+          <p:cNvPr id="33" name="Graphic 32" descr="Computer">
+            <a:extLst>
+              <a:ext uri="{FF2B5EF4-FFF2-40B4-BE49-F238E27FC236}">
+                <a16:creationId xmlns:a16="http://schemas.microsoft.com/office/drawing/2014/main" id="{CC5ADC45-4C8C-0B40-B048-566ABB884D8D}"/>
+              </a:ext>
+            </a:extLst>
+          </p:cNvPr>
+          <p:cNvPicPr>
+            <a:picLocks noChangeAspect="1"/>
+          </p:cNvPicPr>
+          <p:nvPr/>
+        </p:nvPicPr>
+        <p:blipFill>
+          <a:blip r:embed="rId2">
+            <a:extLst>
+              <a:ext uri="{96DAC541-7B7A-43D3-8B79-37D633B846F1}">
+                <asvg:svgBlip xmlns:asvg="http://schemas.microsoft.com/office/drawing/2016/SVG/main" r:embed="rId3"/>
+              </a:ext>
+            </a:extLst>
+          </a:blip>
+          <a:stretch>
+            <a:fillRect/>
+          </a:stretch>
+        </p:blipFill>
+        <p:spPr>
+          <a:xfrm>
+            <a:off x="4493142" y="2982588"/>
+            <a:ext cx="2291316" cy="2291316"/>
+          </a:xfrm>
+          <a:prstGeom prst="rect">
+            <a:avLst/>
+          </a:prstGeom>
+        </p:spPr>
+      </p:pic>
+      <p:pic>
+        <p:nvPicPr>
+          <p:cNvPr id="34" name="Graphic 33" descr="Computer">
+            <a:extLst>
+              <a:ext uri="{FF2B5EF4-FFF2-40B4-BE49-F238E27FC236}">
+                <a16:creationId xmlns:a16="http://schemas.microsoft.com/office/drawing/2014/main" id="{A56749AC-CA30-9445-9046-154D1307ACC3}"/>
+              </a:ext>
+            </a:extLst>
+          </p:cNvPr>
+          <p:cNvPicPr>
+            <a:picLocks noChangeAspect="1"/>
+          </p:cNvPicPr>
+          <p:nvPr/>
+        </p:nvPicPr>
+        <p:blipFill>
+          <a:blip r:embed="rId4">
+            <a:extLst>
+              <a:ext uri="{96DAC541-7B7A-43D3-8B79-37D633B846F1}">
+                <asvg:svgBlip xmlns:asvg="http://schemas.microsoft.com/office/drawing/2016/SVG/main" r:embed="rId5"/>
+              </a:ext>
+            </a:extLst>
+          </a:blip>
+          <a:stretch>
+            <a:fillRect/>
+          </a:stretch>
+        </p:blipFill>
+        <p:spPr>
+          <a:xfrm>
+            <a:off x="7361275" y="2982588"/>
+            <a:ext cx="2291316" cy="2291316"/>
+          </a:xfrm>
+          <a:prstGeom prst="rect">
+            <a:avLst/>
+          </a:prstGeom>
+        </p:spPr>
+      </p:pic>
+      <p:pic>
+        <p:nvPicPr>
+          <p:cNvPr id="35" name="Graphic 34" descr="Computer">
+            <a:extLst>
+              <a:ext uri="{FF2B5EF4-FFF2-40B4-BE49-F238E27FC236}">
+                <a16:creationId xmlns:a16="http://schemas.microsoft.com/office/drawing/2014/main" id="{66812765-5F80-0B46-91E9-4605F4009078}"/>
+              </a:ext>
+            </a:extLst>
+          </p:cNvPr>
+          <p:cNvPicPr>
+            <a:picLocks noChangeAspect="1"/>
+          </p:cNvPicPr>
+          <p:nvPr/>
+        </p:nvPicPr>
+        <p:blipFill>
+          <a:blip r:embed="rId4">
+            <a:extLst>
+              <a:ext uri="{96DAC541-7B7A-43D3-8B79-37D633B846F1}">
+                <asvg:svgBlip xmlns:asvg="http://schemas.microsoft.com/office/drawing/2016/SVG/main" r:embed="rId5"/>
+              </a:ext>
+            </a:extLst>
+          </a:blip>
+          <a:stretch>
+            <a:fillRect/>
+          </a:stretch>
+        </p:blipFill>
+        <p:spPr>
+          <a:xfrm>
+            <a:off x="1625009" y="2982588"/>
+            <a:ext cx="2291316" cy="2291316"/>
+          </a:xfrm>
+          <a:prstGeom prst="rect">
+            <a:avLst/>
+          </a:prstGeom>
+        </p:spPr>
+      </p:pic>
+      <p:cxnSp>
+        <p:nvCxnSpPr>
+          <p:cNvPr id="36" name="Straight Connector 35">
+            <a:extLst>
+              <a:ext uri="{FF2B5EF4-FFF2-40B4-BE49-F238E27FC236}">
+                <a16:creationId xmlns:a16="http://schemas.microsoft.com/office/drawing/2014/main" id="{994251C7-F9DD-3642-93C0-62F6E94F10E2}"/>
+              </a:ext>
+            </a:extLst>
+          </p:cNvPr>
+          <p:cNvCxnSpPr/>
+          <p:nvPr/>
+        </p:nvCxnSpPr>
+        <p:spPr>
+          <a:xfrm>
+            <a:off x="871870" y="5273904"/>
+            <a:ext cx="9357538" cy="0"/>
+          </a:xfrm>
+          <a:prstGeom prst="line">
+            <a:avLst/>
+          </a:prstGeom>
+          <a:ln w="28575">
+            <a:solidFill>
+              <a:srgbClr val="0070C0"/>
+            </a:solidFill>
+          </a:ln>
+        </p:spPr>
+        <p:style>
+          <a:lnRef idx="1">
+            <a:schemeClr val="accent1"/>
+          </a:lnRef>
+          <a:fillRef idx="0">
+            <a:schemeClr val="accent1"/>
+          </a:fillRef>
+          <a:effectRef idx="0">
+            <a:schemeClr val="accent1"/>
+          </a:effectRef>
+          <a:fontRef idx="minor">
+            <a:schemeClr val="tx1"/>
+          </a:fontRef>
+        </p:style>
+      </p:cxnSp>
+      <p:cxnSp>
+        <p:nvCxnSpPr>
+          <p:cNvPr id="37" name="Straight Connector 36">
+            <a:extLst>
+              <a:ext uri="{FF2B5EF4-FFF2-40B4-BE49-F238E27FC236}">
+                <a16:creationId xmlns:a16="http://schemas.microsoft.com/office/drawing/2014/main" id="{4F8EFA3D-935E-FA45-B57E-AEEEF5D6C0A8}"/>
+              </a:ext>
+            </a:extLst>
+          </p:cNvPr>
+          <p:cNvCxnSpPr/>
+          <p:nvPr/>
+        </p:nvCxnSpPr>
+        <p:spPr>
+          <a:xfrm>
+            <a:off x="6420034" y="4823275"/>
+            <a:ext cx="0" cy="425302"/>
+          </a:xfrm>
+          <a:prstGeom prst="line">
+            <a:avLst/>
+          </a:prstGeom>
+          <a:ln w="28575">
+            <a:solidFill>
+              <a:srgbClr val="0070C0"/>
+            </a:solidFill>
+            <a:headEnd type="arrow" w="lg" len="lg"/>
+            <a:tailEnd type="none" w="lg" len="lg"/>
+          </a:ln>
+        </p:spPr>
+        <p:style>
+          <a:lnRef idx="1">
+            <a:schemeClr val="accent1"/>
+          </a:lnRef>
+          <a:fillRef idx="0">
+            <a:schemeClr val="accent1"/>
+          </a:fillRef>
+          <a:effectRef idx="0">
+            <a:schemeClr val="accent1"/>
+          </a:effectRef>
+          <a:fontRef idx="minor">
+            <a:schemeClr val="tx1"/>
+          </a:fontRef>
+        </p:style>
+      </p:cxnSp>
+      <p:cxnSp>
+        <p:nvCxnSpPr>
+          <p:cNvPr id="38" name="Straight Connector 37">
+            <a:extLst>
+              <a:ext uri="{FF2B5EF4-FFF2-40B4-BE49-F238E27FC236}">
+                <a16:creationId xmlns:a16="http://schemas.microsoft.com/office/drawing/2014/main" id="{6F83A2F5-6685-B54C-B354-DCC005756DB9}"/>
+              </a:ext>
+            </a:extLst>
+          </p:cNvPr>
+          <p:cNvCxnSpPr/>
+          <p:nvPr/>
+        </p:nvCxnSpPr>
+        <p:spPr>
+          <a:xfrm>
+            <a:off x="3522921" y="4848602"/>
+            <a:ext cx="0" cy="425302"/>
+          </a:xfrm>
+          <a:prstGeom prst="line">
+            <a:avLst/>
+          </a:prstGeom>
+          <a:ln w="28575">
+            <a:solidFill>
+              <a:srgbClr val="0070C0"/>
+            </a:solidFill>
+            <a:headEnd type="none" w="lg" len="lg"/>
+            <a:tailEnd type="arrow" w="lg" len="lg"/>
+          </a:ln>
+        </p:spPr>
+        <p:style>
+          <a:lnRef idx="1">
+            <a:schemeClr val="accent1"/>
+          </a:lnRef>
+          <a:fillRef idx="0">
+            <a:schemeClr val="accent1"/>
+          </a:fillRef>
+          <a:effectRef idx="0">
+            <a:schemeClr val="accent1"/>
+          </a:effectRef>
+          <a:fontRef idx="minor">
+            <a:schemeClr val="tx1"/>
+          </a:fontRef>
+        </p:style>
+      </p:cxnSp>
+      <p:cxnSp>
+        <p:nvCxnSpPr>
+          <p:cNvPr id="39" name="Straight Connector 38">
+            <a:extLst>
+              <a:ext uri="{FF2B5EF4-FFF2-40B4-BE49-F238E27FC236}">
+                <a16:creationId xmlns:a16="http://schemas.microsoft.com/office/drawing/2014/main" id="{5857BB62-16B8-264D-82D1-37183CD5AA4B}"/>
+              </a:ext>
+            </a:extLst>
+          </p:cNvPr>
+          <p:cNvCxnSpPr/>
+          <p:nvPr/>
+        </p:nvCxnSpPr>
+        <p:spPr>
+          <a:xfrm>
+            <a:off x="9278679" y="4848602"/>
+            <a:ext cx="0" cy="425302"/>
+          </a:xfrm>
+          <a:prstGeom prst="line">
+            <a:avLst/>
+          </a:prstGeom>
+          <a:ln w="28575">
+            <a:solidFill>
+              <a:srgbClr val="0070C0"/>
+            </a:solidFill>
+            <a:headEnd type="arrow" w="lg" len="lg"/>
+            <a:tailEnd type="none" w="lg" len="lg"/>
+          </a:ln>
+        </p:spPr>
+        <p:style>
+          <a:lnRef idx="1">
+            <a:schemeClr val="accent1"/>
+          </a:lnRef>
+          <a:fillRef idx="0">
+            <a:schemeClr val="accent1"/>
+          </a:fillRef>
+          <a:effectRef idx="0">
+            <a:schemeClr val="accent1"/>
+          </a:effectRef>
+          <a:fontRef idx="minor">
+            <a:schemeClr val="tx1"/>
+          </a:fontRef>
+        </p:style>
+      </p:cxnSp>
+      <p:sp>
+        <p:nvSpPr>
+          <p:cNvPr id="40" name="Rounded Rectangle 39">
+            <a:extLst>
+              <a:ext uri="{FF2B5EF4-FFF2-40B4-BE49-F238E27FC236}">
+                <a16:creationId xmlns:a16="http://schemas.microsoft.com/office/drawing/2014/main" id="{32917ED9-88EB-4042-A069-C884B7417CA1}"/>
+              </a:ext>
+            </a:extLst>
+          </p:cNvPr>
+          <p:cNvSpPr/>
+          <p:nvPr/>
+        </p:nvSpPr>
+        <p:spPr>
+          <a:xfrm>
+            <a:off x="3470274" y="5248577"/>
+            <a:ext cx="107951" cy="45719"/>
+          </a:xfrm>
+          <a:prstGeom prst="roundRect">
+            <a:avLst/>
+          </a:prstGeom>
+          <a:solidFill>
+            <a:schemeClr val="bg1"/>
+          </a:solidFill>
+          <a:ln w="28575">
+            <a:solidFill>
+              <a:srgbClr val="0070C0"/>
+            </a:solidFill>
+          </a:ln>
+        </p:spPr>
+        <p:style>
+          <a:lnRef idx="2">
+            <a:schemeClr val="accent1">
+              <a:shade val="50000"/>
+            </a:schemeClr>
+          </a:lnRef>
+          <a:fillRef idx="1">
+            <a:schemeClr val="accent1"/>
+          </a:fillRef>
+          <a:effectRef idx="0">
+            <a:schemeClr val="accent1"/>
+          </a:effectRef>
+          <a:fontRef idx="minor">
+            <a:schemeClr val="lt1"/>
+          </a:fontRef>
+        </p:style>
+        <p:txBody>
+          <a:bodyPr rtlCol="0" anchor="ctr"/>
+          <a:lstStyle/>
+          <a:p>
+            <a:pPr algn="ctr"/>
+            <a:endParaRPr lang="de-DE"/>
+          </a:p>
+        </p:txBody>
+      </p:sp>
+      <p:sp>
+        <p:nvSpPr>
+          <p:cNvPr id="41" name="Rounded Rectangle 40">
+            <a:extLst>
+              <a:ext uri="{FF2B5EF4-FFF2-40B4-BE49-F238E27FC236}">
+                <a16:creationId xmlns:a16="http://schemas.microsoft.com/office/drawing/2014/main" id="{B877E7FC-034D-D74D-9063-EB28FFDA1EF9}"/>
+              </a:ext>
+            </a:extLst>
+          </p:cNvPr>
+          <p:cNvSpPr/>
+          <p:nvPr/>
+        </p:nvSpPr>
+        <p:spPr>
+          <a:xfrm>
+            <a:off x="6374476" y="5248577"/>
+            <a:ext cx="107951" cy="45719"/>
+          </a:xfrm>
+          <a:prstGeom prst="roundRect">
+            <a:avLst/>
+          </a:prstGeom>
+          <a:solidFill>
+            <a:schemeClr val="bg1"/>
+          </a:solidFill>
+          <a:ln w="28575">
+            <a:solidFill>
+              <a:srgbClr val="0070C0"/>
+            </a:solidFill>
+          </a:ln>
+        </p:spPr>
+        <p:style>
+          <a:lnRef idx="2">
+            <a:schemeClr val="accent1">
+              <a:shade val="50000"/>
+            </a:schemeClr>
+          </a:lnRef>
+          <a:fillRef idx="1">
+            <a:schemeClr val="accent1"/>
+          </a:fillRef>
+          <a:effectRef idx="0">
+            <a:schemeClr val="accent1"/>
+          </a:effectRef>
+          <a:fontRef idx="minor">
+            <a:schemeClr val="lt1"/>
+          </a:fontRef>
+        </p:style>
+        <p:txBody>
+          <a:bodyPr rtlCol="0" anchor="ctr"/>
+          <a:lstStyle/>
+          <a:p>
+            <a:pPr algn="ctr"/>
+            <a:endParaRPr lang="de-DE"/>
+          </a:p>
+        </p:txBody>
+      </p:sp>
+      <p:sp>
+        <p:nvSpPr>
+          <p:cNvPr id="42" name="Rounded Rectangle 41">
+            <a:extLst>
+              <a:ext uri="{FF2B5EF4-FFF2-40B4-BE49-F238E27FC236}">
+                <a16:creationId xmlns:a16="http://schemas.microsoft.com/office/drawing/2014/main" id="{79F6A7B5-014D-6045-A4E3-F32194176B63}"/>
+              </a:ext>
+            </a:extLst>
+          </p:cNvPr>
+          <p:cNvSpPr/>
+          <p:nvPr/>
+        </p:nvSpPr>
+        <p:spPr>
+          <a:xfrm>
+            <a:off x="9224702" y="5248577"/>
+            <a:ext cx="107951" cy="45719"/>
+          </a:xfrm>
+          <a:prstGeom prst="roundRect">
+            <a:avLst/>
+          </a:prstGeom>
+          <a:solidFill>
+            <a:schemeClr val="bg1"/>
+          </a:solidFill>
+          <a:ln w="28575">
+            <a:solidFill>
+              <a:srgbClr val="0070C0"/>
+            </a:solidFill>
+          </a:ln>
+        </p:spPr>
+        <p:style>
+          <a:lnRef idx="2">
+            <a:schemeClr val="accent1">
+              <a:shade val="50000"/>
+            </a:schemeClr>
+          </a:lnRef>
+          <a:fillRef idx="1">
+            <a:schemeClr val="accent1"/>
+          </a:fillRef>
+          <a:effectRef idx="0">
+            <a:schemeClr val="accent1"/>
+          </a:effectRef>
+          <a:fontRef idx="minor">
+            <a:schemeClr val="lt1"/>
+          </a:fontRef>
+        </p:style>
+        <p:txBody>
+          <a:bodyPr rtlCol="0" anchor="ctr"/>
+          <a:lstStyle/>
+          <a:p>
+            <a:pPr algn="ctr"/>
+            <a:endParaRPr lang="de-DE"/>
+          </a:p>
+        </p:txBody>
+      </p:sp>
+      <p:sp>
+        <p:nvSpPr>
+          <p:cNvPr id="43" name="TextBox 42">
+            <a:extLst>
+              <a:ext uri="{FF2B5EF4-FFF2-40B4-BE49-F238E27FC236}">
+                <a16:creationId xmlns:a16="http://schemas.microsoft.com/office/drawing/2014/main" id="{004B5871-0382-AC43-ADE7-0D1B7228FEA0}"/>
+              </a:ext>
+            </a:extLst>
+          </p:cNvPr>
+          <p:cNvSpPr txBox="1"/>
+          <p:nvPr/>
+        </p:nvSpPr>
+        <p:spPr>
+          <a:xfrm>
+            <a:off x="4795284" y="2982588"/>
+            <a:ext cx="837280" cy="338554"/>
+          </a:xfrm>
+          <a:prstGeom prst="rect">
+            <a:avLst/>
+          </a:prstGeom>
+          <a:noFill/>
+        </p:spPr>
+        <p:txBody>
+          <a:bodyPr wrap="none" rtlCol="0">
+            <a:spAutoFit/>
+          </a:bodyPr>
+          <a:lstStyle/>
+          <a:p>
+            <a:r>
+              <a:rPr lang="de-DE" sz="1600" dirty="0">
+                <a:solidFill>
+                  <a:srgbClr val="0070C0"/>
+                </a:solidFill>
+                <a:latin typeface="Futura Medium" panose="020B0602020204020303" pitchFamily="34" charset="-79"/>
+                <a:cs typeface="Futura Medium" panose="020B0602020204020303" pitchFamily="34" charset="-79"/>
+              </a:rPr>
+              <a:t>Master</a:t>
+            </a:r>
+          </a:p>
+        </p:txBody>
+      </p:sp>
+      <p:sp>
+        <p:nvSpPr>
+          <p:cNvPr id="44" name="TextBox 43">
+            <a:extLst>
+              <a:ext uri="{FF2B5EF4-FFF2-40B4-BE49-F238E27FC236}">
+                <a16:creationId xmlns:a16="http://schemas.microsoft.com/office/drawing/2014/main" id="{3C13D8FB-02D4-984B-8BC6-2406C938386A}"/>
+              </a:ext>
+            </a:extLst>
+          </p:cNvPr>
+          <p:cNvSpPr txBox="1"/>
+          <p:nvPr/>
+        </p:nvSpPr>
+        <p:spPr>
+          <a:xfrm>
+            <a:off x="1520487" y="2982588"/>
+            <a:ext cx="1663084" cy="338554"/>
+          </a:xfrm>
+          <a:prstGeom prst="rect">
+            <a:avLst/>
+          </a:prstGeom>
+          <a:noFill/>
+        </p:spPr>
+        <p:txBody>
+          <a:bodyPr wrap="none" rtlCol="0">
+            <a:spAutoFit/>
+          </a:bodyPr>
+          <a:lstStyle/>
+          <a:p>
+            <a:pPr algn="ctr"/>
+            <a:r>
+              <a:rPr lang="de-DE" sz="1600" dirty="0" err="1">
+                <a:solidFill>
+                  <a:srgbClr val="0070C0"/>
+                </a:solidFill>
+                <a:latin typeface="Futura Medium" panose="020B0602020204020303" pitchFamily="34" charset="-79"/>
+                <a:cs typeface="Futura Medium" panose="020B0602020204020303" pitchFamily="34" charset="-79"/>
+              </a:rPr>
+              <a:t>External</a:t>
+            </a:r>
+            <a:r>
+              <a:rPr lang="de-DE" sz="1600" dirty="0">
+                <a:solidFill>
+                  <a:srgbClr val="0070C0"/>
+                </a:solidFill>
+                <a:latin typeface="Futura Medium" panose="020B0602020204020303" pitchFamily="34" charset="-79"/>
+                <a:cs typeface="Futura Medium" panose="020B0602020204020303" pitchFamily="34" charset="-79"/>
+              </a:rPr>
+              <a:t> </a:t>
+            </a:r>
+            <a:r>
+              <a:rPr lang="de-DE" sz="1600" dirty="0" err="1">
+                <a:solidFill>
+                  <a:srgbClr val="0070C0"/>
+                </a:solidFill>
+                <a:latin typeface="Futura Medium" panose="020B0602020204020303" pitchFamily="34" charset="-79"/>
+                <a:cs typeface="Futura Medium" panose="020B0602020204020303" pitchFamily="34" charset="-79"/>
+              </a:rPr>
+              <a:t>Visuals</a:t>
+            </a:r>
+            <a:endParaRPr lang="de-DE" sz="1600" dirty="0">
+              <a:solidFill>
+                <a:srgbClr val="0070C0"/>
+              </a:solidFill>
+              <a:latin typeface="Futura Medium" panose="020B0602020204020303" pitchFamily="34" charset="-79"/>
+              <a:cs typeface="Futura Medium" panose="020B0602020204020303" pitchFamily="34" charset="-79"/>
+            </a:endParaRPr>
+          </a:p>
+        </p:txBody>
+      </p:sp>
+      <p:pic>
+        <p:nvPicPr>
+          <p:cNvPr id="45" name="Graphic 44" descr="Aeroplane">
+            <a:extLst>
+              <a:ext uri="{FF2B5EF4-FFF2-40B4-BE49-F238E27FC236}">
+                <a16:creationId xmlns:a16="http://schemas.microsoft.com/office/drawing/2014/main" id="{46BAFE57-4278-1140-9F84-84543E460B77}"/>
+              </a:ext>
+            </a:extLst>
+          </p:cNvPr>
+          <p:cNvPicPr>
+            <a:picLocks noChangeAspect="1"/>
+          </p:cNvPicPr>
+          <p:nvPr/>
+        </p:nvPicPr>
+        <p:blipFill>
+          <a:blip r:embed="rId6">
+            <a:extLst>
+              <a:ext uri="{96DAC541-7B7A-43D3-8B79-37D633B846F1}">
+                <asvg:svgBlip xmlns:asvg="http://schemas.microsoft.com/office/drawing/2016/SVG/main" r:embed="rId7"/>
+              </a:ext>
+            </a:extLst>
+          </a:blip>
+          <a:stretch>
+            <a:fillRect/>
+          </a:stretch>
+        </p:blipFill>
+        <p:spPr>
+          <a:xfrm rot="16200000">
+            <a:off x="5004261" y="4017307"/>
+            <a:ext cx="434106" cy="434106"/>
+          </a:xfrm>
+          <a:prstGeom prst="rect">
+            <a:avLst/>
+          </a:prstGeom>
+        </p:spPr>
+      </p:pic>
+      <p:pic>
+        <p:nvPicPr>
+          <p:cNvPr id="46" name="Graphic 45" descr="Aeroplane">
+            <a:extLst>
+              <a:ext uri="{FF2B5EF4-FFF2-40B4-BE49-F238E27FC236}">
+                <a16:creationId xmlns:a16="http://schemas.microsoft.com/office/drawing/2014/main" id="{BF615A5B-656E-4D46-84ED-22B9B86CEE68}"/>
+              </a:ext>
+            </a:extLst>
+          </p:cNvPr>
+          <p:cNvPicPr>
+            <a:picLocks noChangeAspect="1"/>
+          </p:cNvPicPr>
+          <p:nvPr/>
+        </p:nvPicPr>
+        <p:blipFill>
+          <a:blip r:embed="rId8">
+            <a:extLst>
+              <a:ext uri="{96DAC541-7B7A-43D3-8B79-37D633B846F1}">
+                <asvg:svgBlip xmlns:asvg="http://schemas.microsoft.com/office/drawing/2016/SVG/main" r:embed="rId9"/>
+              </a:ext>
+            </a:extLst>
+          </a:blip>
+          <a:stretch>
+            <a:fillRect/>
+          </a:stretch>
+        </p:blipFill>
+        <p:spPr>
+          <a:xfrm rot="16200000">
+            <a:off x="5001986" y="3614699"/>
+            <a:ext cx="434106" cy="434106"/>
+          </a:xfrm>
+          <a:prstGeom prst="rect">
+            <a:avLst/>
+          </a:prstGeom>
+        </p:spPr>
+      </p:pic>
+      <p:sp>
+        <p:nvSpPr>
+          <p:cNvPr id="48" name="TextBox 47">
+            <a:extLst>
+              <a:ext uri="{FF2B5EF4-FFF2-40B4-BE49-F238E27FC236}">
+                <a16:creationId xmlns:a16="http://schemas.microsoft.com/office/drawing/2014/main" id="{F5F48B14-1514-6549-9C41-88C3B955D0DA}"/>
+              </a:ext>
+            </a:extLst>
+          </p:cNvPr>
+          <p:cNvSpPr txBox="1"/>
+          <p:nvPr/>
+        </p:nvSpPr>
+        <p:spPr>
+          <a:xfrm>
+            <a:off x="4716267" y="3589308"/>
+            <a:ext cx="1010093" cy="738664"/>
+          </a:xfrm>
+          <a:prstGeom prst="rect">
+            <a:avLst/>
+          </a:prstGeom>
+          <a:noFill/>
+          <a:effectLst>
+            <a:outerShdw dist="25400" dir="2700000" algn="tl" rotWithShape="0">
+              <a:schemeClr val="bg1"/>
+            </a:outerShdw>
+          </a:effectLst>
+        </p:spPr>
+        <p:txBody>
+          <a:bodyPr wrap="square" rtlCol="0">
+            <a:spAutoFit/>
+          </a:bodyPr>
+          <a:lstStyle/>
+          <a:p>
+            <a:pPr algn="ctr"/>
+            <a:r>
+              <a:rPr lang="de-DE" sz="1400" dirty="0">
+                <a:solidFill>
+                  <a:srgbClr val="0070C0"/>
+                </a:solidFill>
+                <a:latin typeface="Futura Medium" panose="020B0602020204020303" pitchFamily="34" charset="-79"/>
+                <a:cs typeface="Futura Medium" panose="020B0602020204020303" pitchFamily="34" charset="-79"/>
+              </a:rPr>
+              <a:t>Remote Client,</a:t>
+            </a:r>
+            <a:br>
+              <a:rPr lang="de-DE" sz="1400" dirty="0">
+                <a:solidFill>
+                  <a:srgbClr val="0070C0"/>
+                </a:solidFill>
+                <a:latin typeface="Futura Medium" panose="020B0602020204020303" pitchFamily="34" charset="-79"/>
+                <a:cs typeface="Futura Medium" panose="020B0602020204020303" pitchFamily="34" charset="-79"/>
+              </a:rPr>
+            </a:br>
+            <a:r>
+              <a:rPr lang="de-DE" sz="1400" dirty="0" err="1">
+                <a:solidFill>
+                  <a:srgbClr val="0070C0"/>
+                </a:solidFill>
+                <a:latin typeface="Futura Medium" panose="020B0602020204020303" pitchFamily="34" charset="-79"/>
+                <a:cs typeface="Futura Medium" panose="020B0602020204020303" pitchFamily="34" charset="-79"/>
+              </a:rPr>
+              <a:t>LiveTraffic</a:t>
+            </a:r>
+            <a:endParaRPr lang="de-DE" sz="1400" dirty="0">
+              <a:solidFill>
+                <a:srgbClr val="0070C0"/>
+              </a:solidFill>
+              <a:latin typeface="Futura Medium" panose="020B0602020204020303" pitchFamily="34" charset="-79"/>
+              <a:cs typeface="Futura Medium" panose="020B0602020204020303" pitchFamily="34" charset="-79"/>
+            </a:endParaRPr>
+          </a:p>
+        </p:txBody>
+      </p:sp>
+      <p:sp>
+        <p:nvSpPr>
+          <p:cNvPr id="49" name="TextBox 48">
+            <a:extLst>
+              <a:ext uri="{FF2B5EF4-FFF2-40B4-BE49-F238E27FC236}">
+                <a16:creationId xmlns:a16="http://schemas.microsoft.com/office/drawing/2014/main" id="{6BC1447D-DC9A-C14C-9C6C-F70345B4270A}"/>
+              </a:ext>
+            </a:extLst>
+          </p:cNvPr>
+          <p:cNvSpPr txBox="1"/>
+          <p:nvPr/>
+        </p:nvSpPr>
+        <p:spPr>
+          <a:xfrm>
+            <a:off x="7669569" y="2982588"/>
+            <a:ext cx="1663084" cy="338554"/>
+          </a:xfrm>
+          <a:prstGeom prst="rect">
+            <a:avLst/>
+          </a:prstGeom>
+          <a:noFill/>
+        </p:spPr>
+        <p:txBody>
+          <a:bodyPr wrap="none" rtlCol="0">
+            <a:spAutoFit/>
+          </a:bodyPr>
+          <a:lstStyle/>
+          <a:p>
+            <a:pPr algn="ctr"/>
+            <a:r>
+              <a:rPr lang="de-DE" sz="1600" dirty="0" err="1">
+                <a:solidFill>
+                  <a:srgbClr val="0070C0"/>
+                </a:solidFill>
+                <a:latin typeface="Futura Medium" panose="020B0602020204020303" pitchFamily="34" charset="-79"/>
+                <a:cs typeface="Futura Medium" panose="020B0602020204020303" pitchFamily="34" charset="-79"/>
+              </a:rPr>
+              <a:t>External</a:t>
+            </a:r>
+            <a:r>
+              <a:rPr lang="de-DE" sz="1600" dirty="0">
+                <a:solidFill>
+                  <a:srgbClr val="0070C0"/>
+                </a:solidFill>
+                <a:latin typeface="Futura Medium" panose="020B0602020204020303" pitchFamily="34" charset="-79"/>
+                <a:cs typeface="Futura Medium" panose="020B0602020204020303" pitchFamily="34" charset="-79"/>
+              </a:rPr>
+              <a:t> </a:t>
+            </a:r>
+            <a:r>
+              <a:rPr lang="de-DE" sz="1600" dirty="0" err="1">
+                <a:solidFill>
+                  <a:srgbClr val="0070C0"/>
+                </a:solidFill>
+                <a:latin typeface="Futura Medium" panose="020B0602020204020303" pitchFamily="34" charset="-79"/>
+                <a:cs typeface="Futura Medium" panose="020B0602020204020303" pitchFamily="34" charset="-79"/>
+              </a:rPr>
+              <a:t>Visuals</a:t>
+            </a:r>
+            <a:endParaRPr lang="de-DE" sz="1600" dirty="0">
+              <a:solidFill>
+                <a:srgbClr val="0070C0"/>
+              </a:solidFill>
+              <a:latin typeface="Futura Medium" panose="020B0602020204020303" pitchFamily="34" charset="-79"/>
+              <a:cs typeface="Futura Medium" panose="020B0602020204020303" pitchFamily="34" charset="-79"/>
+            </a:endParaRPr>
+          </a:p>
+        </p:txBody>
+      </p:sp>
+      <p:pic>
+        <p:nvPicPr>
+          <p:cNvPr id="50" name="Graphic 49" descr="Aeroplane">
+            <a:extLst>
+              <a:ext uri="{FF2B5EF4-FFF2-40B4-BE49-F238E27FC236}">
+                <a16:creationId xmlns:a16="http://schemas.microsoft.com/office/drawing/2014/main" id="{757CBE8B-8127-624A-8E57-5618DCF1B02F}"/>
+              </a:ext>
+            </a:extLst>
+          </p:cNvPr>
+          <p:cNvPicPr>
+            <a:picLocks noChangeAspect="1"/>
+          </p:cNvPicPr>
+          <p:nvPr/>
+        </p:nvPicPr>
+        <p:blipFill rotWithShape="1">
+          <a:blip r:embed="rId8">
+            <a:extLst>
+              <a:ext uri="{96DAC541-7B7A-43D3-8B79-37D633B846F1}">
+                <asvg:svgBlip xmlns:asvg="http://schemas.microsoft.com/office/drawing/2016/SVG/main" r:embed="rId9"/>
+              </a:ext>
+            </a:extLst>
+          </a:blip>
+          <a:srcRect b="41212"/>
+          <a:stretch/>
+        </p:blipFill>
+        <p:spPr>
+          <a:xfrm rot="16200000">
+            <a:off x="2542344" y="3713033"/>
+            <a:ext cx="434106" cy="255202"/>
+          </a:xfrm>
+          <a:prstGeom prst="rect">
+            <a:avLst/>
+          </a:prstGeom>
+        </p:spPr>
+      </p:pic>
+      <p:sp>
+        <p:nvSpPr>
+          <p:cNvPr id="51" name="TextBox 50">
+            <a:extLst>
+              <a:ext uri="{FF2B5EF4-FFF2-40B4-BE49-F238E27FC236}">
+                <a16:creationId xmlns:a16="http://schemas.microsoft.com/office/drawing/2014/main" id="{C0A85DEE-E259-B246-81E5-BF5C0911A4A3}"/>
+              </a:ext>
+            </a:extLst>
+          </p:cNvPr>
+          <p:cNvSpPr txBox="1"/>
+          <p:nvPr/>
+        </p:nvSpPr>
+        <p:spPr>
+          <a:xfrm>
+            <a:off x="1697974" y="3651191"/>
+            <a:ext cx="1229384" cy="738664"/>
+          </a:xfrm>
+          <a:prstGeom prst="rect">
+            <a:avLst/>
+          </a:prstGeom>
+          <a:noFill/>
+        </p:spPr>
+        <p:txBody>
+          <a:bodyPr wrap="square" rtlCol="0">
+            <a:spAutoFit/>
+          </a:bodyPr>
+          <a:lstStyle/>
+          <a:p>
+            <a:pPr algn="ctr"/>
+            <a:r>
+              <a:rPr lang="de-DE" sz="1400" dirty="0" err="1">
+                <a:solidFill>
+                  <a:srgbClr val="0070C0"/>
+                </a:solidFill>
+                <a:latin typeface="Futura Medium" panose="020B0602020204020303" pitchFamily="34" charset="-79"/>
+                <a:cs typeface="Futura Medium" panose="020B0602020204020303" pitchFamily="34" charset="-79"/>
+              </a:rPr>
+              <a:t>xPilot</a:t>
+            </a:r>
+            <a:r>
+              <a:rPr lang="de-DE" sz="1400" dirty="0">
+                <a:solidFill>
+                  <a:srgbClr val="0070C0"/>
+                </a:solidFill>
+                <a:latin typeface="Futura Medium" panose="020B0602020204020303" pitchFamily="34" charset="-79"/>
+                <a:cs typeface="Futura Medium" panose="020B0602020204020303" pitchFamily="34" charset="-79"/>
+              </a:rPr>
+              <a:t>,</a:t>
+            </a:r>
+          </a:p>
+          <a:p>
+            <a:pPr algn="ctr"/>
+            <a:r>
+              <a:rPr lang="de-DE" sz="1400" dirty="0">
+                <a:solidFill>
+                  <a:srgbClr val="0070C0"/>
+                </a:solidFill>
+                <a:latin typeface="Futura Medium" panose="020B0602020204020303" pitchFamily="34" charset="-79"/>
+                <a:cs typeface="Futura Medium" panose="020B0602020204020303" pitchFamily="34" charset="-79"/>
+              </a:rPr>
+              <a:t>Remote Client</a:t>
+            </a:r>
+          </a:p>
+        </p:txBody>
+      </p:sp>
+      <p:sp>
+        <p:nvSpPr>
+          <p:cNvPr id="52" name="TextBox 51">
+            <a:extLst>
+              <a:ext uri="{FF2B5EF4-FFF2-40B4-BE49-F238E27FC236}">
+                <a16:creationId xmlns:a16="http://schemas.microsoft.com/office/drawing/2014/main" id="{00A2C26F-2EF5-2949-9458-1C4ED21EF7AA}"/>
+              </a:ext>
+            </a:extLst>
+          </p:cNvPr>
+          <p:cNvSpPr txBox="1"/>
+          <p:nvPr/>
+        </p:nvSpPr>
+        <p:spPr>
+          <a:xfrm>
+            <a:off x="7581475" y="3651191"/>
+            <a:ext cx="1010093" cy="646331"/>
+          </a:xfrm>
+          <a:prstGeom prst="rect">
+            <a:avLst/>
+          </a:prstGeom>
+          <a:noFill/>
+        </p:spPr>
+        <p:txBody>
+          <a:bodyPr wrap="square" rtlCol="0">
+            <a:spAutoFit/>
+          </a:bodyPr>
+          <a:lstStyle/>
+          <a:p>
+            <a:pPr algn="ctr"/>
+            <a:r>
+              <a:rPr lang="de-DE" dirty="0">
+                <a:solidFill>
+                  <a:srgbClr val="0070C0"/>
+                </a:solidFill>
+                <a:latin typeface="Futura Medium" panose="020B0602020204020303" pitchFamily="34" charset="-79"/>
+                <a:cs typeface="Futura Medium" panose="020B0602020204020303" pitchFamily="34" charset="-79"/>
+              </a:rPr>
+              <a:t>Remote Client</a:t>
+            </a:r>
+          </a:p>
+        </p:txBody>
+      </p:sp>
+      <p:pic>
+        <p:nvPicPr>
+          <p:cNvPr id="53" name="Graphic 52" descr="Aeroplane">
+            <a:extLst>
+              <a:ext uri="{FF2B5EF4-FFF2-40B4-BE49-F238E27FC236}">
+                <a16:creationId xmlns:a16="http://schemas.microsoft.com/office/drawing/2014/main" id="{EF6B665D-7205-8F46-B817-7F8A484249B9}"/>
+              </a:ext>
+            </a:extLst>
+          </p:cNvPr>
+          <p:cNvPicPr>
+            <a:picLocks noChangeAspect="1"/>
+          </p:cNvPicPr>
+          <p:nvPr/>
+        </p:nvPicPr>
+        <p:blipFill rotWithShape="1">
+          <a:blip r:embed="rId6">
+            <a:extLst>
+              <a:ext uri="{96DAC541-7B7A-43D3-8B79-37D633B846F1}">
+                <asvg:svgBlip xmlns:asvg="http://schemas.microsoft.com/office/drawing/2016/SVG/main" r:embed="rId7"/>
+              </a:ext>
+            </a:extLst>
+          </a:blip>
+          <a:srcRect b="41212"/>
+          <a:stretch/>
+        </p:blipFill>
+        <p:spPr>
+          <a:xfrm rot="16200000">
+            <a:off x="2553717" y="4074698"/>
+            <a:ext cx="434106" cy="255202"/>
+          </a:xfrm>
+          <a:prstGeom prst="rect">
+            <a:avLst/>
+          </a:prstGeom>
+        </p:spPr>
+      </p:pic>
+      <p:pic>
+        <p:nvPicPr>
+          <p:cNvPr id="54" name="Graphic 53" descr="Aeroplane">
+            <a:extLst>
+              <a:ext uri="{FF2B5EF4-FFF2-40B4-BE49-F238E27FC236}">
+                <a16:creationId xmlns:a16="http://schemas.microsoft.com/office/drawing/2014/main" id="{A2F64617-C066-F845-B7B7-D0D77F9F281C}"/>
+              </a:ext>
+            </a:extLst>
+          </p:cNvPr>
+          <p:cNvPicPr>
+            <a:picLocks noChangeAspect="1"/>
+          </p:cNvPicPr>
+          <p:nvPr/>
+        </p:nvPicPr>
+        <p:blipFill rotWithShape="1">
+          <a:blip r:embed="rId6">
+            <a:extLst>
+              <a:ext uri="{96DAC541-7B7A-43D3-8B79-37D633B846F1}">
+                <asvg:svgBlip xmlns:asvg="http://schemas.microsoft.com/office/drawing/2016/SVG/main" r:embed="rId7"/>
+              </a:ext>
+            </a:extLst>
+          </a:blip>
+          <a:srcRect t="56861"/>
+          <a:stretch/>
+        </p:blipFill>
+        <p:spPr>
+          <a:xfrm rot="16200000">
+            <a:off x="7449138" y="4082060"/>
+            <a:ext cx="434106" cy="187268"/>
+          </a:xfrm>
+          <a:prstGeom prst="rect">
+            <a:avLst/>
+          </a:prstGeom>
+        </p:spPr>
+      </p:pic>
+      <p:pic>
+        <p:nvPicPr>
+          <p:cNvPr id="55" name="Graphic 54" descr="Aeroplane">
+            <a:extLst>
+              <a:ext uri="{FF2B5EF4-FFF2-40B4-BE49-F238E27FC236}">
+                <a16:creationId xmlns:a16="http://schemas.microsoft.com/office/drawing/2014/main" id="{76C81B39-8F57-1145-9E0A-6BE0C69ABC65}"/>
+              </a:ext>
+            </a:extLst>
+          </p:cNvPr>
+          <p:cNvPicPr>
+            <a:picLocks noChangeAspect="1"/>
+          </p:cNvPicPr>
+          <p:nvPr/>
+        </p:nvPicPr>
+        <p:blipFill rotWithShape="1">
+          <a:blip r:embed="rId8">
+            <a:extLst>
+              <a:ext uri="{96DAC541-7B7A-43D3-8B79-37D633B846F1}">
+                <asvg:svgBlip xmlns:asvg="http://schemas.microsoft.com/office/drawing/2016/SVG/main" r:embed="rId9"/>
+              </a:ext>
+            </a:extLst>
+          </a:blip>
+          <a:srcRect t="56861"/>
+          <a:stretch/>
+        </p:blipFill>
+        <p:spPr>
+          <a:xfrm rot="16200000">
+            <a:off x="7458056" y="3747000"/>
+            <a:ext cx="434106" cy="187268"/>
+          </a:xfrm>
+          <a:prstGeom prst="rect">
+            <a:avLst/>
+          </a:prstGeom>
+        </p:spPr>
+      </p:pic>
+      <p:pic>
+        <p:nvPicPr>
+          <p:cNvPr id="56" name="Picture 55">
+            <a:extLst>
+              <a:ext uri="{FF2B5EF4-FFF2-40B4-BE49-F238E27FC236}">
+                <a16:creationId xmlns:a16="http://schemas.microsoft.com/office/drawing/2014/main" id="{36DB9603-C796-B140-BC7A-AB2FB6FD9884}"/>
+              </a:ext>
+            </a:extLst>
+          </p:cNvPr>
+          <p:cNvPicPr>
+            <a:picLocks noChangeAspect="1"/>
+          </p:cNvPicPr>
+          <p:nvPr/>
+        </p:nvPicPr>
+        <p:blipFill>
+          <a:blip r:embed="rId10"/>
+          <a:stretch>
+            <a:fillRect/>
+          </a:stretch>
+        </p:blipFill>
+        <p:spPr>
+          <a:xfrm>
+            <a:off x="871870" y="4665587"/>
+            <a:ext cx="582990" cy="582990"/>
+          </a:xfrm>
+          <a:prstGeom prst="rect">
+            <a:avLst/>
+          </a:prstGeom>
+        </p:spPr>
+      </p:pic>
+      <p:sp>
+        <p:nvSpPr>
+          <p:cNvPr id="2" name="TextBox 1">
+            <a:extLst>
+              <a:ext uri="{FF2B5EF4-FFF2-40B4-BE49-F238E27FC236}">
+                <a16:creationId xmlns:a16="http://schemas.microsoft.com/office/drawing/2014/main" id="{793F19EA-021D-4D44-A4EA-6A0277917333}"/>
+              </a:ext>
+            </a:extLst>
+          </p:cNvPr>
+          <p:cNvSpPr txBox="1"/>
+          <p:nvPr/>
+        </p:nvSpPr>
+        <p:spPr>
+          <a:xfrm>
+            <a:off x="871870" y="1092748"/>
+            <a:ext cx="6833024" cy="646331"/>
+          </a:xfrm>
+          <a:prstGeom prst="rect">
+            <a:avLst/>
+          </a:prstGeom>
+          <a:noFill/>
+        </p:spPr>
+        <p:txBody>
+          <a:bodyPr wrap="none" rtlCol="0">
+            <a:spAutoFit/>
+          </a:bodyPr>
+          <a:lstStyle/>
+          <a:p>
+            <a:r>
+              <a:rPr lang="de-DE" dirty="0">
+                <a:solidFill>
+                  <a:schemeClr val="accent1">
+                    <a:lumMod val="75000"/>
+                  </a:schemeClr>
+                </a:solidFill>
+              </a:rPr>
+              <a:t>Senders </a:t>
+            </a:r>
+            <a:r>
+              <a:rPr lang="de-DE" dirty="0" err="1">
+                <a:solidFill>
+                  <a:schemeClr val="accent1">
+                    <a:lumMod val="75000"/>
+                  </a:schemeClr>
+                </a:solidFill>
+              </a:rPr>
+              <a:t>can</a:t>
+            </a:r>
+            <a:r>
+              <a:rPr lang="de-DE" dirty="0">
+                <a:solidFill>
+                  <a:schemeClr val="accent1">
+                    <a:lumMod val="75000"/>
+                  </a:schemeClr>
+                </a:solidFill>
+              </a:rPr>
+              <a:t> </a:t>
+            </a:r>
+            <a:r>
+              <a:rPr lang="de-DE" dirty="0" err="1">
+                <a:solidFill>
+                  <a:schemeClr val="accent1">
+                    <a:lumMod val="75000"/>
+                  </a:schemeClr>
+                </a:solidFill>
+              </a:rPr>
+              <a:t>sit</a:t>
+            </a:r>
+            <a:r>
+              <a:rPr lang="de-DE" dirty="0">
+                <a:solidFill>
+                  <a:schemeClr val="accent1">
+                    <a:lumMod val="75000"/>
+                  </a:schemeClr>
+                </a:solidFill>
+              </a:rPr>
+              <a:t> on </a:t>
+            </a:r>
+            <a:r>
+              <a:rPr lang="de-DE" dirty="0" err="1">
+                <a:solidFill>
+                  <a:schemeClr val="accent1">
+                    <a:lumMod val="75000"/>
+                  </a:schemeClr>
+                </a:solidFill>
+              </a:rPr>
+              <a:t>any</a:t>
+            </a:r>
+            <a:r>
+              <a:rPr lang="de-DE" dirty="0">
+                <a:solidFill>
+                  <a:schemeClr val="accent1">
+                    <a:lumMod val="75000"/>
+                  </a:schemeClr>
+                </a:solidFill>
+              </a:rPr>
+              <a:t> </a:t>
+            </a:r>
+            <a:r>
+              <a:rPr lang="de-DE" dirty="0" err="1">
+                <a:solidFill>
+                  <a:schemeClr val="accent1">
+                    <a:lumMod val="75000"/>
+                  </a:schemeClr>
+                </a:solidFill>
+              </a:rPr>
+              <a:t>computer</a:t>
+            </a:r>
+            <a:r>
+              <a:rPr lang="de-DE" dirty="0">
+                <a:solidFill>
+                  <a:schemeClr val="accent1">
+                    <a:lumMod val="75000"/>
+                  </a:schemeClr>
+                </a:solidFill>
+              </a:rPr>
+              <a:t> in </a:t>
+            </a:r>
+            <a:r>
+              <a:rPr lang="de-DE" dirty="0" err="1">
+                <a:solidFill>
+                  <a:schemeClr val="accent1">
+                    <a:lumMod val="75000"/>
+                  </a:schemeClr>
+                </a:solidFill>
+              </a:rPr>
+              <a:t>the</a:t>
+            </a:r>
+            <a:r>
+              <a:rPr lang="de-DE" dirty="0">
+                <a:solidFill>
+                  <a:schemeClr val="accent1">
+                    <a:lumMod val="75000"/>
+                  </a:schemeClr>
+                </a:solidFill>
+              </a:rPr>
+              <a:t> </a:t>
+            </a:r>
+            <a:r>
+              <a:rPr lang="de-DE" dirty="0" err="1">
+                <a:solidFill>
+                  <a:schemeClr val="accent1">
+                    <a:lumMod val="75000"/>
+                  </a:schemeClr>
+                </a:solidFill>
+              </a:rPr>
+              <a:t>network</a:t>
+            </a:r>
+            <a:r>
+              <a:rPr lang="de-DE" dirty="0">
+                <a:solidFill>
+                  <a:schemeClr val="accent1">
+                    <a:lumMod val="75000"/>
+                  </a:schemeClr>
+                </a:solidFill>
+              </a:rPr>
+              <a:t>.</a:t>
+            </a:r>
+          </a:p>
+          <a:p>
+            <a:r>
+              <a:rPr lang="de-DE" dirty="0">
+                <a:solidFill>
+                  <a:schemeClr val="accent1">
+                    <a:lumMod val="75000"/>
+                  </a:schemeClr>
+                </a:solidFill>
+              </a:rPr>
+              <a:t>Remote Clients </a:t>
+            </a:r>
+            <a:r>
+              <a:rPr lang="de-DE" dirty="0" err="1">
+                <a:solidFill>
+                  <a:schemeClr val="accent1">
+                    <a:lumMod val="75000"/>
+                  </a:schemeClr>
+                </a:solidFill>
+              </a:rPr>
+              <a:t>need</a:t>
+            </a:r>
+            <a:r>
+              <a:rPr lang="de-DE" dirty="0">
+                <a:solidFill>
+                  <a:schemeClr val="accent1">
+                    <a:lumMod val="75000"/>
+                  </a:schemeClr>
+                </a:solidFill>
+              </a:rPr>
+              <a:t> </a:t>
+            </a:r>
+            <a:r>
+              <a:rPr lang="de-DE" dirty="0" err="1">
+                <a:solidFill>
+                  <a:schemeClr val="accent1">
+                    <a:lumMod val="75000"/>
+                  </a:schemeClr>
+                </a:solidFill>
+              </a:rPr>
+              <a:t>to</a:t>
+            </a:r>
+            <a:r>
+              <a:rPr lang="de-DE" dirty="0">
+                <a:solidFill>
+                  <a:schemeClr val="accent1">
+                    <a:lumMod val="75000"/>
+                  </a:schemeClr>
+                </a:solidFill>
+              </a:rPr>
+              <a:t> </a:t>
+            </a:r>
+            <a:r>
+              <a:rPr lang="de-DE" dirty="0" err="1">
+                <a:solidFill>
+                  <a:schemeClr val="accent1">
+                    <a:lumMod val="75000"/>
+                  </a:schemeClr>
+                </a:solidFill>
+              </a:rPr>
+              <a:t>run</a:t>
+            </a:r>
+            <a:r>
+              <a:rPr lang="de-DE" dirty="0">
+                <a:solidFill>
+                  <a:schemeClr val="accent1">
+                    <a:lumMod val="75000"/>
+                  </a:schemeClr>
+                </a:solidFill>
+              </a:rPr>
+              <a:t> on all </a:t>
+            </a:r>
+            <a:r>
+              <a:rPr lang="de-DE" dirty="0" err="1">
+                <a:solidFill>
+                  <a:schemeClr val="accent1">
+                    <a:lumMod val="75000"/>
+                  </a:schemeClr>
+                </a:solidFill>
+              </a:rPr>
+              <a:t>computers</a:t>
+            </a:r>
+            <a:r>
+              <a:rPr lang="de-DE" dirty="0">
+                <a:solidFill>
+                  <a:schemeClr val="accent1">
+                    <a:lumMod val="75000"/>
+                  </a:schemeClr>
+                </a:solidFill>
+              </a:rPr>
+              <a:t> </a:t>
+            </a:r>
+            <a:r>
+              <a:rPr lang="de-DE" dirty="0" err="1">
+                <a:solidFill>
+                  <a:schemeClr val="accent1">
+                    <a:lumMod val="75000"/>
+                  </a:schemeClr>
+                </a:solidFill>
+              </a:rPr>
+              <a:t>if</a:t>
+            </a:r>
+            <a:r>
+              <a:rPr lang="de-DE" dirty="0">
+                <a:solidFill>
+                  <a:schemeClr val="accent1">
+                    <a:lumMod val="75000"/>
+                  </a:schemeClr>
+                </a:solidFill>
+              </a:rPr>
+              <a:t> </a:t>
+            </a:r>
+            <a:r>
+              <a:rPr lang="de-DE" dirty="0" err="1">
+                <a:solidFill>
+                  <a:schemeClr val="accent1">
+                    <a:lumMod val="75000"/>
+                  </a:schemeClr>
+                </a:solidFill>
+              </a:rPr>
+              <a:t>senders</a:t>
+            </a:r>
+            <a:r>
+              <a:rPr lang="de-DE" dirty="0">
+                <a:solidFill>
+                  <a:schemeClr val="accent1">
+                    <a:lumMod val="75000"/>
+                  </a:schemeClr>
+                </a:solidFill>
+              </a:rPr>
+              <a:t> </a:t>
+            </a:r>
+            <a:r>
+              <a:rPr lang="de-DE" dirty="0" err="1">
+                <a:solidFill>
+                  <a:schemeClr val="accent1">
+                    <a:lumMod val="75000"/>
+                  </a:schemeClr>
+                </a:solidFill>
+              </a:rPr>
+              <a:t>are</a:t>
+            </a:r>
+            <a:r>
+              <a:rPr lang="de-DE" dirty="0">
+                <a:solidFill>
+                  <a:schemeClr val="accent1">
+                    <a:lumMod val="75000"/>
+                  </a:schemeClr>
+                </a:solidFill>
+              </a:rPr>
+              <a:t> </a:t>
+            </a:r>
+            <a:r>
+              <a:rPr lang="de-DE" dirty="0" err="1">
+                <a:solidFill>
+                  <a:schemeClr val="accent1">
+                    <a:lumMod val="75000"/>
+                  </a:schemeClr>
+                </a:solidFill>
+              </a:rPr>
+              <a:t>distributed</a:t>
+            </a:r>
+            <a:r>
+              <a:rPr lang="de-DE" dirty="0">
+                <a:solidFill>
+                  <a:schemeClr val="accent1">
+                    <a:lumMod val="75000"/>
+                  </a:schemeClr>
+                </a:solidFill>
+              </a:rPr>
+              <a:t>:</a:t>
+            </a:r>
+          </a:p>
+        </p:txBody>
+      </p:sp>
+    </p:spTree>
+    <p:extLst>
+      <p:ext uri="{BB962C8B-B14F-4D97-AF65-F5344CB8AC3E}">
+        <p14:creationId xmlns:p14="http://schemas.microsoft.com/office/powerpoint/2010/main" val="808739851"/>
+      </p:ext>
+    </p:extLst>
+  </p:cSld>
+  <p:clrMapOvr>
+    <a:masterClrMapping/>
+  </p:clrMapOvr>
+</p:sld>
+</file>
+
+<file path=ppt/slides/slide5.xml><?xml version="1.0" encoding="utf-8"?>
+<p:sld xmlns:a="http://schemas.openxmlformats.org/drawingml/2006/main" xmlns:r="http://schemas.openxmlformats.org/officeDocument/2006/relationships" xmlns:p="http://schemas.openxmlformats.org/presentationml/2006/main">
+  <p:cSld>
+    <p:spTree>
+      <p:nvGrpSpPr>
+        <p:cNvPr id="1" name=""/>
+        <p:cNvGrpSpPr/>
+        <p:nvPr/>
+      </p:nvGrpSpPr>
+      <p:grpSpPr>
+        <a:xfrm>
+          <a:off x="0" y="0"/>
+          <a:ext cx="0" cy="0"/>
+          <a:chOff x="0" y="0"/>
+          <a:chExt cx="0" cy="0"/>
+        </a:xfrm>
+      </p:grpSpPr>
+      <p:pic>
+        <p:nvPicPr>
+          <p:cNvPr id="33" name="Graphic 32" descr="Computer">
+            <a:extLst>
+              <a:ext uri="{FF2B5EF4-FFF2-40B4-BE49-F238E27FC236}">
+                <a16:creationId xmlns:a16="http://schemas.microsoft.com/office/drawing/2014/main" id="{CC5ADC45-4C8C-0B40-B048-566ABB884D8D}"/>
+              </a:ext>
+            </a:extLst>
+          </p:cNvPr>
+          <p:cNvPicPr>
+            <a:picLocks noChangeAspect="1"/>
+          </p:cNvPicPr>
+          <p:nvPr/>
+        </p:nvPicPr>
+        <p:blipFill>
+          <a:blip r:embed="rId2">
+            <a:extLst>
+              <a:ext uri="{96DAC541-7B7A-43D3-8B79-37D633B846F1}">
+                <asvg:svgBlip xmlns:asvg="http://schemas.microsoft.com/office/drawing/2016/SVG/main" r:embed="rId3"/>
+              </a:ext>
+            </a:extLst>
+          </a:blip>
+          <a:stretch>
+            <a:fillRect/>
+          </a:stretch>
+        </p:blipFill>
+        <p:spPr>
+          <a:xfrm>
+            <a:off x="3269974" y="1759420"/>
+            <a:ext cx="3514484" cy="3514484"/>
+          </a:xfrm>
+          <a:prstGeom prst="rect">
+            <a:avLst/>
+          </a:prstGeom>
+        </p:spPr>
+      </p:pic>
+      <p:pic>
+        <p:nvPicPr>
+          <p:cNvPr id="45" name="Graphic 44" descr="Aeroplane">
+            <a:extLst>
+              <a:ext uri="{FF2B5EF4-FFF2-40B4-BE49-F238E27FC236}">
+                <a16:creationId xmlns:a16="http://schemas.microsoft.com/office/drawing/2014/main" id="{46BAFE57-4278-1140-9F84-84543E460B77}"/>
+              </a:ext>
+            </a:extLst>
+          </p:cNvPr>
+          <p:cNvPicPr>
+            <a:picLocks noChangeAspect="1"/>
+          </p:cNvPicPr>
+          <p:nvPr/>
+        </p:nvPicPr>
+        <p:blipFill>
+          <a:blip r:embed="rId4">
+            <a:extLst>
+              <a:ext uri="{96DAC541-7B7A-43D3-8B79-37D633B846F1}">
+                <asvg:svgBlip xmlns:asvg="http://schemas.microsoft.com/office/drawing/2016/SVG/main" r:embed="rId5"/>
+              </a:ext>
+            </a:extLst>
+          </a:blip>
+          <a:stretch>
+            <a:fillRect/>
+          </a:stretch>
+        </p:blipFill>
+        <p:spPr>
+          <a:xfrm rot="16200000">
+            <a:off x="4248887" y="3325083"/>
+            <a:ext cx="434106" cy="434106"/>
+          </a:xfrm>
+          <a:prstGeom prst="rect">
+            <a:avLst/>
+          </a:prstGeom>
+        </p:spPr>
+      </p:pic>
+      <p:pic>
+        <p:nvPicPr>
+          <p:cNvPr id="46" name="Graphic 45" descr="Aeroplane">
+            <a:extLst>
+              <a:ext uri="{FF2B5EF4-FFF2-40B4-BE49-F238E27FC236}">
+                <a16:creationId xmlns:a16="http://schemas.microsoft.com/office/drawing/2014/main" id="{BF615A5B-656E-4D46-84ED-22B9B86CEE68}"/>
+              </a:ext>
+            </a:extLst>
+          </p:cNvPr>
+          <p:cNvPicPr>
+            <a:picLocks noChangeAspect="1"/>
+          </p:cNvPicPr>
+          <p:nvPr/>
+        </p:nvPicPr>
+        <p:blipFill>
+          <a:blip r:embed="rId6">
+            <a:extLst>
+              <a:ext uri="{96DAC541-7B7A-43D3-8B79-37D633B846F1}">
+                <asvg:svgBlip xmlns:asvg="http://schemas.microsoft.com/office/drawing/2016/SVG/main" r:embed="rId7"/>
+              </a:ext>
+            </a:extLst>
+          </a:blip>
+          <a:stretch>
+            <a:fillRect/>
+          </a:stretch>
+        </p:blipFill>
+        <p:spPr>
+          <a:xfrm rot="16200000">
+            <a:off x="4246612" y="2922475"/>
+            <a:ext cx="434106" cy="434106"/>
+          </a:xfrm>
+          <a:prstGeom prst="rect">
+            <a:avLst/>
+          </a:prstGeom>
+        </p:spPr>
+      </p:pic>
+      <p:sp>
+        <p:nvSpPr>
+          <p:cNvPr id="48" name="TextBox 47">
+            <a:extLst>
+              <a:ext uri="{FF2B5EF4-FFF2-40B4-BE49-F238E27FC236}">
+                <a16:creationId xmlns:a16="http://schemas.microsoft.com/office/drawing/2014/main" id="{F5F48B14-1514-6549-9C41-88C3B955D0DA}"/>
+              </a:ext>
+            </a:extLst>
+          </p:cNvPr>
+          <p:cNvSpPr txBox="1"/>
+          <p:nvPr/>
+        </p:nvSpPr>
+        <p:spPr>
+          <a:xfrm>
+            <a:off x="3667538" y="2627294"/>
+            <a:ext cx="1630018" cy="1290353"/>
+          </a:xfrm>
+          <a:prstGeom prst="rect">
+            <a:avLst/>
+          </a:prstGeom>
+          <a:noFill/>
+          <a:effectLst>
+            <a:outerShdw dist="25400" dir="5400000" algn="ctr" rotWithShape="0">
+              <a:schemeClr val="bg1"/>
+            </a:outerShdw>
+          </a:effectLst>
+        </p:spPr>
+        <p:txBody>
+          <a:bodyPr wrap="square" rtlCol="0">
+            <a:spAutoFit/>
+          </a:bodyPr>
+          <a:lstStyle/>
+          <a:p>
+            <a:pPr algn="ctr">
+              <a:lnSpc>
+                <a:spcPct val="150000"/>
+              </a:lnSpc>
+            </a:pPr>
+            <a:r>
+              <a:rPr lang="de-DE" dirty="0" err="1">
+                <a:solidFill>
+                  <a:srgbClr val="0070C0"/>
+                </a:solidFill>
+                <a:latin typeface="Futura Medium" panose="020B0602020204020303" pitchFamily="34" charset="-79"/>
+                <a:cs typeface="Futura Medium" panose="020B0602020204020303" pitchFamily="34" charset="-79"/>
+              </a:rPr>
+              <a:t>LiveTraffic</a:t>
+            </a:r>
+            <a:r>
+              <a:rPr lang="de-DE" dirty="0">
+                <a:solidFill>
+                  <a:srgbClr val="0070C0"/>
+                </a:solidFill>
+                <a:latin typeface="Futura Medium" panose="020B0602020204020303" pitchFamily="34" charset="-79"/>
+                <a:cs typeface="Futura Medium" panose="020B0602020204020303" pitchFamily="34" charset="-79"/>
+              </a:rPr>
+              <a:t>,</a:t>
+            </a:r>
+          </a:p>
+          <a:p>
+            <a:pPr algn="ctr">
+              <a:lnSpc>
+                <a:spcPct val="150000"/>
+              </a:lnSpc>
+            </a:pPr>
+            <a:r>
+              <a:rPr lang="de-DE" dirty="0" err="1">
+                <a:solidFill>
+                  <a:srgbClr val="0070C0"/>
+                </a:solidFill>
+                <a:latin typeface="Futura Medium" panose="020B0602020204020303" pitchFamily="34" charset="-79"/>
+                <a:cs typeface="Futura Medium" panose="020B0602020204020303" pitchFamily="34" charset="-79"/>
+              </a:rPr>
+              <a:t>xPilot</a:t>
+            </a:r>
+            <a:r>
+              <a:rPr lang="de-DE" dirty="0">
+                <a:solidFill>
+                  <a:srgbClr val="0070C0"/>
+                </a:solidFill>
+                <a:latin typeface="Futura Medium" panose="020B0602020204020303" pitchFamily="34" charset="-79"/>
+                <a:cs typeface="Futura Medium" panose="020B0602020204020303" pitchFamily="34" charset="-79"/>
+              </a:rPr>
+              <a:t>,</a:t>
+            </a:r>
+          </a:p>
+          <a:p>
+            <a:pPr algn="ctr">
+              <a:lnSpc>
+                <a:spcPct val="150000"/>
+              </a:lnSpc>
+            </a:pPr>
+            <a:r>
+              <a:rPr lang="de-DE" dirty="0">
+                <a:solidFill>
+                  <a:srgbClr val="0070C0"/>
+                </a:solidFill>
+                <a:latin typeface="Futura Medium" panose="020B0602020204020303" pitchFamily="34" charset="-79"/>
+                <a:cs typeface="Futura Medium" panose="020B0602020204020303" pitchFamily="34" charset="-79"/>
+              </a:rPr>
+              <a:t>Remote Client</a:t>
+            </a:r>
+          </a:p>
+        </p:txBody>
+      </p:sp>
+      <p:pic>
+        <p:nvPicPr>
+          <p:cNvPr id="56" name="Picture 55">
+            <a:extLst>
+              <a:ext uri="{FF2B5EF4-FFF2-40B4-BE49-F238E27FC236}">
+                <a16:creationId xmlns:a16="http://schemas.microsoft.com/office/drawing/2014/main" id="{36DB9603-C796-B140-BC7A-AB2FB6FD9884}"/>
+              </a:ext>
+            </a:extLst>
+          </p:cNvPr>
+          <p:cNvPicPr>
+            <a:picLocks noChangeAspect="1"/>
+          </p:cNvPicPr>
+          <p:nvPr/>
+        </p:nvPicPr>
+        <p:blipFill>
+          <a:blip r:embed="rId8"/>
+          <a:stretch>
+            <a:fillRect/>
+          </a:stretch>
+        </p:blipFill>
+        <p:spPr>
+          <a:xfrm>
+            <a:off x="871870" y="4665587"/>
+            <a:ext cx="582990" cy="582990"/>
+          </a:xfrm>
+          <a:prstGeom prst="rect">
+            <a:avLst/>
+          </a:prstGeom>
+        </p:spPr>
+      </p:pic>
+      <p:sp>
+        <p:nvSpPr>
+          <p:cNvPr id="2" name="TextBox 1">
+            <a:extLst>
+              <a:ext uri="{FF2B5EF4-FFF2-40B4-BE49-F238E27FC236}">
+                <a16:creationId xmlns:a16="http://schemas.microsoft.com/office/drawing/2014/main" id="{793F19EA-021D-4D44-A4EA-6A0277917333}"/>
+              </a:ext>
+            </a:extLst>
+          </p:cNvPr>
+          <p:cNvSpPr txBox="1"/>
+          <p:nvPr/>
+        </p:nvSpPr>
+        <p:spPr>
+          <a:xfrm>
+            <a:off x="871870" y="1092748"/>
+            <a:ext cx="9318513" cy="923330"/>
+          </a:xfrm>
+          <a:prstGeom prst="rect">
+            <a:avLst/>
+          </a:prstGeom>
+          <a:noFill/>
+        </p:spPr>
+        <p:txBody>
+          <a:bodyPr wrap="none" rtlCol="0">
+            <a:spAutoFit/>
+          </a:bodyPr>
+          <a:lstStyle/>
+          <a:p>
+            <a:r>
+              <a:rPr lang="de-DE" b="1" dirty="0">
+                <a:solidFill>
+                  <a:schemeClr val="accent1">
+                    <a:lumMod val="75000"/>
+                  </a:schemeClr>
+                </a:solidFill>
+              </a:rPr>
+              <a:t>TCAS </a:t>
+            </a:r>
+            <a:r>
+              <a:rPr lang="de-DE" b="1" dirty="0" err="1">
+                <a:solidFill>
+                  <a:schemeClr val="accent1">
+                    <a:lumMod val="75000"/>
+                  </a:schemeClr>
+                </a:solidFill>
+              </a:rPr>
+              <a:t>Concentrator</a:t>
+            </a:r>
+            <a:r>
+              <a:rPr lang="de-DE" b="1" dirty="0">
+                <a:solidFill>
+                  <a:schemeClr val="accent1">
+                    <a:lumMod val="75000"/>
+                  </a:schemeClr>
+                </a:solidFill>
+              </a:rPr>
+              <a:t>:</a:t>
+            </a:r>
+          </a:p>
+          <a:p>
+            <a:r>
+              <a:rPr lang="de-DE" dirty="0">
+                <a:solidFill>
+                  <a:schemeClr val="accent1">
+                    <a:lumMod val="75000"/>
+                  </a:schemeClr>
+                </a:solidFill>
+              </a:rPr>
+              <a:t>Even </a:t>
+            </a:r>
+            <a:r>
+              <a:rPr lang="de-DE" dirty="0" err="1">
+                <a:solidFill>
+                  <a:schemeClr val="accent1">
+                    <a:lumMod val="75000"/>
+                  </a:schemeClr>
+                </a:solidFill>
+              </a:rPr>
+              <a:t>if</a:t>
+            </a:r>
+            <a:r>
+              <a:rPr lang="de-DE" dirty="0">
+                <a:solidFill>
+                  <a:schemeClr val="accent1">
+                    <a:lumMod val="75000"/>
+                  </a:schemeClr>
+                </a:solidFill>
+              </a:rPr>
+              <a:t> </a:t>
+            </a:r>
+            <a:r>
+              <a:rPr lang="de-DE" dirty="0" err="1">
+                <a:solidFill>
+                  <a:schemeClr val="accent1">
+                    <a:lumMod val="75000"/>
+                  </a:schemeClr>
+                </a:solidFill>
+              </a:rPr>
+              <a:t>run</a:t>
+            </a:r>
+            <a:r>
+              <a:rPr lang="de-DE" dirty="0">
+                <a:solidFill>
+                  <a:schemeClr val="accent1">
+                    <a:lumMod val="75000"/>
+                  </a:schemeClr>
+                </a:solidFill>
+              </a:rPr>
+              <a:t> </a:t>
+            </a:r>
+            <a:r>
+              <a:rPr lang="de-DE" dirty="0" err="1">
+                <a:solidFill>
+                  <a:schemeClr val="accent1">
+                    <a:lumMod val="75000"/>
+                  </a:schemeClr>
+                </a:solidFill>
+              </a:rPr>
+              <a:t>locally</a:t>
+            </a:r>
+            <a:r>
+              <a:rPr lang="de-DE" dirty="0">
+                <a:solidFill>
+                  <a:schemeClr val="accent1">
+                    <a:lumMod val="75000"/>
+                  </a:schemeClr>
+                </a:solidFill>
+              </a:rPr>
+              <a:t> </a:t>
+            </a:r>
+            <a:r>
+              <a:rPr lang="de-DE" dirty="0" err="1">
+                <a:solidFill>
+                  <a:schemeClr val="accent1">
+                    <a:lumMod val="75000"/>
+                  </a:schemeClr>
+                </a:solidFill>
+              </a:rPr>
+              <a:t>only</a:t>
+            </a:r>
+            <a:r>
+              <a:rPr lang="de-DE" dirty="0">
+                <a:solidFill>
+                  <a:schemeClr val="accent1">
+                    <a:lumMod val="75000"/>
+                  </a:schemeClr>
+                </a:solidFill>
+              </a:rPr>
+              <a:t> </a:t>
+            </a:r>
+            <a:r>
+              <a:rPr lang="de-DE" dirty="0" err="1">
+                <a:solidFill>
+                  <a:schemeClr val="accent1">
+                    <a:lumMod val="75000"/>
+                  </a:schemeClr>
+                </a:solidFill>
+              </a:rPr>
+              <a:t>the</a:t>
+            </a:r>
+            <a:r>
+              <a:rPr lang="de-DE" dirty="0">
+                <a:solidFill>
+                  <a:schemeClr val="accent1">
+                    <a:lumMod val="75000"/>
+                  </a:schemeClr>
+                </a:solidFill>
+              </a:rPr>
+              <a:t> Remote Client </a:t>
+            </a:r>
+            <a:r>
+              <a:rPr lang="de-DE" dirty="0" err="1">
+                <a:solidFill>
+                  <a:schemeClr val="accent1">
+                    <a:lumMod val="75000"/>
+                  </a:schemeClr>
+                </a:solidFill>
+              </a:rPr>
+              <a:t>has</a:t>
+            </a:r>
+            <a:r>
+              <a:rPr lang="de-DE" dirty="0">
+                <a:solidFill>
+                  <a:schemeClr val="accent1">
+                    <a:lumMod val="75000"/>
+                  </a:schemeClr>
+                </a:solidFill>
+              </a:rPr>
+              <a:t> </a:t>
+            </a:r>
+            <a:r>
+              <a:rPr lang="de-DE" dirty="0" err="1">
+                <a:solidFill>
+                  <a:schemeClr val="accent1">
+                    <a:lumMod val="75000"/>
+                  </a:schemeClr>
+                </a:solidFill>
+              </a:rPr>
+              <a:t>the</a:t>
+            </a:r>
+            <a:r>
+              <a:rPr lang="de-DE" dirty="0">
+                <a:solidFill>
+                  <a:schemeClr val="accent1">
+                    <a:lumMod val="75000"/>
+                  </a:schemeClr>
+                </a:solidFill>
+              </a:rPr>
+              <a:t> </a:t>
+            </a:r>
+            <a:r>
+              <a:rPr lang="de-DE" dirty="0" err="1">
+                <a:solidFill>
+                  <a:schemeClr val="accent1">
+                    <a:lumMod val="75000"/>
+                  </a:schemeClr>
+                </a:solidFill>
+              </a:rPr>
+              <a:t>benefit</a:t>
+            </a:r>
+            <a:r>
+              <a:rPr lang="de-DE" dirty="0">
+                <a:solidFill>
+                  <a:schemeClr val="accent1">
+                    <a:lumMod val="75000"/>
+                  </a:schemeClr>
+                </a:solidFill>
+              </a:rPr>
+              <a:t> </a:t>
+            </a:r>
+            <a:r>
+              <a:rPr lang="de-DE" dirty="0" err="1">
+                <a:solidFill>
+                  <a:schemeClr val="accent1">
+                    <a:lumMod val="75000"/>
+                  </a:schemeClr>
+                </a:solidFill>
+              </a:rPr>
+              <a:t>of</a:t>
+            </a:r>
+            <a:r>
+              <a:rPr lang="de-DE" dirty="0">
+                <a:solidFill>
+                  <a:schemeClr val="accent1">
+                    <a:lumMod val="75000"/>
+                  </a:schemeClr>
+                </a:solidFill>
+              </a:rPr>
+              <a:t> </a:t>
+            </a:r>
+            <a:r>
+              <a:rPr lang="de-DE" dirty="0" err="1">
+                <a:solidFill>
+                  <a:schemeClr val="accent1">
+                    <a:lumMod val="75000"/>
+                  </a:schemeClr>
+                </a:solidFill>
+              </a:rPr>
+              <a:t>combining</a:t>
+            </a:r>
+            <a:r>
+              <a:rPr lang="de-DE" dirty="0">
+                <a:solidFill>
+                  <a:schemeClr val="accent1">
+                    <a:lumMod val="75000"/>
+                  </a:schemeClr>
+                </a:solidFill>
+              </a:rPr>
+              <a:t> all</a:t>
+            </a:r>
+          </a:p>
+          <a:p>
+            <a:r>
+              <a:rPr lang="de-DE" dirty="0">
+                <a:solidFill>
+                  <a:schemeClr val="accent1">
+                    <a:lumMod val="75000"/>
+                  </a:schemeClr>
+                </a:solidFill>
+              </a:rPr>
+              <a:t>planes </a:t>
+            </a:r>
+            <a:r>
+              <a:rPr lang="de-DE" dirty="0" err="1">
+                <a:solidFill>
+                  <a:schemeClr val="accent1">
+                    <a:lumMod val="75000"/>
+                  </a:schemeClr>
+                </a:solidFill>
+              </a:rPr>
+              <a:t>created</a:t>
+            </a:r>
+            <a:r>
+              <a:rPr lang="de-DE" dirty="0">
+                <a:solidFill>
+                  <a:schemeClr val="accent1">
+                    <a:lumMod val="75000"/>
+                  </a:schemeClr>
+                </a:solidFill>
+              </a:rPr>
+              <a:t> </a:t>
+            </a:r>
+            <a:r>
+              <a:rPr lang="de-DE" dirty="0" err="1">
+                <a:solidFill>
+                  <a:schemeClr val="accent1">
+                    <a:lumMod val="75000"/>
+                  </a:schemeClr>
+                </a:solidFill>
+              </a:rPr>
+              <a:t>by</a:t>
+            </a:r>
+            <a:r>
+              <a:rPr lang="de-DE" dirty="0">
+                <a:solidFill>
+                  <a:schemeClr val="accent1">
+                    <a:lumMod val="75000"/>
+                  </a:schemeClr>
+                </a:solidFill>
+              </a:rPr>
+              <a:t> </a:t>
+            </a:r>
+            <a:r>
+              <a:rPr lang="de-DE" dirty="0" err="1">
+                <a:solidFill>
+                  <a:schemeClr val="accent1">
+                    <a:lumMod val="75000"/>
+                  </a:schemeClr>
+                </a:solidFill>
+              </a:rPr>
+              <a:t>any</a:t>
+            </a:r>
+            <a:r>
+              <a:rPr lang="de-DE" dirty="0">
+                <a:solidFill>
+                  <a:schemeClr val="accent1">
+                    <a:lumMod val="75000"/>
+                  </a:schemeClr>
+                </a:solidFill>
+              </a:rPr>
+              <a:t> </a:t>
+            </a:r>
+            <a:r>
+              <a:rPr lang="de-DE" dirty="0" err="1">
+                <a:solidFill>
+                  <a:schemeClr val="accent1">
+                    <a:lumMod val="75000"/>
+                  </a:schemeClr>
+                </a:solidFill>
+              </a:rPr>
+              <a:t>plugin</a:t>
+            </a:r>
+            <a:r>
+              <a:rPr lang="de-DE" dirty="0">
+                <a:solidFill>
+                  <a:schemeClr val="accent1">
+                    <a:lumMod val="75000"/>
+                  </a:schemeClr>
+                </a:solidFill>
+              </a:rPr>
+              <a:t> </a:t>
+            </a:r>
+            <a:r>
+              <a:rPr lang="de-DE" dirty="0" err="1">
+                <a:solidFill>
+                  <a:schemeClr val="accent1">
+                    <a:lumMod val="75000"/>
+                  </a:schemeClr>
+                </a:solidFill>
+              </a:rPr>
+              <a:t>for</a:t>
+            </a:r>
+            <a:r>
+              <a:rPr lang="de-DE" dirty="0">
+                <a:solidFill>
+                  <a:schemeClr val="accent1">
+                    <a:lumMod val="75000"/>
+                  </a:schemeClr>
+                </a:solidFill>
+              </a:rPr>
+              <a:t> </a:t>
+            </a:r>
+            <a:r>
+              <a:rPr lang="de-DE" dirty="0" err="1">
+                <a:solidFill>
+                  <a:schemeClr val="accent1">
+                    <a:lumMod val="75000"/>
+                  </a:schemeClr>
+                </a:solidFill>
+              </a:rPr>
+              <a:t>the</a:t>
+            </a:r>
+            <a:r>
+              <a:rPr lang="de-DE" dirty="0">
+                <a:solidFill>
+                  <a:schemeClr val="accent1">
+                    <a:lumMod val="75000"/>
+                  </a:schemeClr>
+                </a:solidFill>
+              </a:rPr>
+              <a:t> </a:t>
+            </a:r>
+            <a:r>
+              <a:rPr lang="de-DE" dirty="0" err="1">
+                <a:solidFill>
+                  <a:schemeClr val="accent1">
+                    <a:lumMod val="75000"/>
+                  </a:schemeClr>
+                </a:solidFill>
+              </a:rPr>
+              <a:t>purpose</a:t>
+            </a:r>
+            <a:r>
+              <a:rPr lang="de-DE" dirty="0">
+                <a:solidFill>
+                  <a:schemeClr val="accent1">
+                    <a:lumMod val="75000"/>
+                  </a:schemeClr>
+                </a:solidFill>
+              </a:rPr>
+              <a:t> </a:t>
+            </a:r>
+            <a:r>
+              <a:rPr lang="de-DE" dirty="0" err="1">
+                <a:solidFill>
+                  <a:schemeClr val="accent1">
+                    <a:lumMod val="75000"/>
+                  </a:schemeClr>
+                </a:solidFill>
+              </a:rPr>
+              <a:t>of</a:t>
+            </a:r>
+            <a:r>
+              <a:rPr lang="de-DE" dirty="0">
+                <a:solidFill>
+                  <a:schemeClr val="accent1">
+                    <a:lumMod val="75000"/>
+                  </a:schemeClr>
+                </a:solidFill>
+              </a:rPr>
+              <a:t> TCAS </a:t>
+            </a:r>
+            <a:r>
+              <a:rPr lang="de-DE" dirty="0" err="1">
+                <a:solidFill>
+                  <a:schemeClr val="accent1">
+                    <a:lumMod val="75000"/>
+                  </a:schemeClr>
+                </a:solidFill>
+              </a:rPr>
+              <a:t>and</a:t>
+            </a:r>
+            <a:r>
+              <a:rPr lang="de-DE" dirty="0">
+                <a:solidFill>
+                  <a:schemeClr val="accent1">
+                    <a:lumMod val="75000"/>
+                  </a:schemeClr>
+                </a:solidFill>
+              </a:rPr>
+              <a:t> </a:t>
+            </a:r>
+            <a:r>
+              <a:rPr lang="de-DE" dirty="0" err="1">
+                <a:solidFill>
+                  <a:schemeClr val="accent1">
+                    <a:lumMod val="75000"/>
+                  </a:schemeClr>
+                </a:solidFill>
+              </a:rPr>
+              <a:t>multiplayer</a:t>
+            </a:r>
+            <a:r>
+              <a:rPr lang="de-DE" dirty="0">
+                <a:solidFill>
+                  <a:schemeClr val="accent1">
+                    <a:lumMod val="75000"/>
+                  </a:schemeClr>
+                </a:solidFill>
+              </a:rPr>
+              <a:t> </a:t>
+            </a:r>
+            <a:r>
+              <a:rPr lang="de-DE" dirty="0" err="1">
+                <a:solidFill>
+                  <a:schemeClr val="accent1">
+                    <a:lumMod val="75000"/>
+                  </a:schemeClr>
+                </a:solidFill>
+              </a:rPr>
+              <a:t>interfaces</a:t>
+            </a:r>
+            <a:r>
+              <a:rPr lang="de-DE" dirty="0">
+                <a:solidFill>
+                  <a:schemeClr val="accent1">
+                    <a:lumMod val="75000"/>
+                  </a:schemeClr>
+                </a:solidFill>
+              </a:rPr>
+              <a:t> </a:t>
+            </a:r>
+            <a:r>
+              <a:rPr lang="de-DE" dirty="0" err="1">
+                <a:solidFill>
+                  <a:schemeClr val="accent1">
+                    <a:lumMod val="75000"/>
+                  </a:schemeClr>
+                </a:solidFill>
+              </a:rPr>
+              <a:t>to</a:t>
+            </a:r>
+            <a:r>
+              <a:rPr lang="de-DE" dirty="0">
+                <a:solidFill>
+                  <a:schemeClr val="accent1">
+                    <a:lumMod val="75000"/>
+                  </a:schemeClr>
+                </a:solidFill>
+              </a:rPr>
+              <a:t> 3rd </a:t>
+            </a:r>
+            <a:r>
+              <a:rPr lang="de-DE" dirty="0" err="1">
+                <a:solidFill>
+                  <a:schemeClr val="accent1">
+                    <a:lumMod val="75000"/>
+                  </a:schemeClr>
+                </a:solidFill>
+              </a:rPr>
+              <a:t>party</a:t>
+            </a:r>
+            <a:r>
+              <a:rPr lang="de-DE" dirty="0">
+                <a:solidFill>
+                  <a:schemeClr val="accent1">
+                    <a:lumMod val="75000"/>
+                  </a:schemeClr>
+                </a:solidFill>
+              </a:rPr>
+              <a:t> </a:t>
+            </a:r>
+            <a:r>
+              <a:rPr lang="de-DE" dirty="0" err="1">
+                <a:solidFill>
+                  <a:schemeClr val="accent1">
+                    <a:lumMod val="75000"/>
+                  </a:schemeClr>
+                </a:solidFill>
+              </a:rPr>
+              <a:t>tools</a:t>
+            </a:r>
+            <a:r>
+              <a:rPr lang="de-DE" dirty="0">
+                <a:solidFill>
+                  <a:schemeClr val="accent1">
+                    <a:lumMod val="75000"/>
+                  </a:schemeClr>
+                </a:solidFill>
+              </a:rPr>
+              <a:t>:</a:t>
+            </a:r>
+          </a:p>
+        </p:txBody>
+      </p:sp>
+      <p:sp>
+        <p:nvSpPr>
+          <p:cNvPr id="3" name="Rounded Rectangle 2">
+            <a:extLst>
+              <a:ext uri="{FF2B5EF4-FFF2-40B4-BE49-F238E27FC236}">
+                <a16:creationId xmlns:a16="http://schemas.microsoft.com/office/drawing/2014/main" id="{4CDD3015-73CD-6443-BFAA-E2A0E6C83509}"/>
+              </a:ext>
+            </a:extLst>
+          </p:cNvPr>
+          <p:cNvSpPr/>
+          <p:nvPr/>
+        </p:nvSpPr>
+        <p:spPr>
+          <a:xfrm>
+            <a:off x="1259831" y="2975605"/>
+            <a:ext cx="2027582" cy="1133061"/>
+          </a:xfrm>
+          <a:prstGeom prst="roundRect">
+            <a:avLst/>
+          </a:prstGeom>
+          <a:solidFill>
+            <a:schemeClr val="bg1"/>
+          </a:solidFill>
+        </p:spPr>
+        <p:style>
+          <a:lnRef idx="2">
+            <a:schemeClr val="accent1">
+              <a:shade val="50000"/>
+            </a:schemeClr>
+          </a:lnRef>
+          <a:fillRef idx="1">
+            <a:schemeClr val="accent1"/>
+          </a:fillRef>
+          <a:effectRef idx="0">
+            <a:schemeClr val="accent1"/>
+          </a:effectRef>
+          <a:fontRef idx="minor">
+            <a:schemeClr val="lt1"/>
+          </a:fontRef>
+        </p:style>
+        <p:txBody>
+          <a:bodyPr rtlCol="0" anchor="t"/>
+          <a:lstStyle/>
+          <a:p>
+            <a:r>
+              <a:rPr lang="de-DE" dirty="0">
+                <a:solidFill>
+                  <a:schemeClr val="accent1">
+                    <a:lumMod val="75000"/>
+                  </a:schemeClr>
+                </a:solidFill>
+              </a:rPr>
+              <a:t>Garmin </a:t>
+            </a:r>
+            <a:r>
+              <a:rPr lang="de-DE" dirty="0" err="1">
+                <a:solidFill>
+                  <a:schemeClr val="accent1">
+                    <a:lumMod val="75000"/>
+                  </a:schemeClr>
+                </a:solidFill>
+              </a:rPr>
+              <a:t>or</a:t>
+            </a:r>
+            <a:r>
+              <a:rPr lang="de-DE" dirty="0">
+                <a:solidFill>
+                  <a:schemeClr val="accent1">
+                    <a:lumMod val="75000"/>
+                  </a:schemeClr>
+                </a:solidFill>
+              </a:rPr>
+              <a:t> </a:t>
+            </a:r>
+            <a:r>
+              <a:rPr lang="de-DE" dirty="0" err="1">
+                <a:solidFill>
+                  <a:schemeClr val="accent1">
+                    <a:lumMod val="75000"/>
+                  </a:schemeClr>
+                </a:solidFill>
+              </a:rPr>
+              <a:t>LittleNavMap</a:t>
+            </a:r>
+            <a:endParaRPr lang="de-DE" dirty="0">
+              <a:solidFill>
+                <a:schemeClr val="accent1">
+                  <a:lumMod val="75000"/>
+                </a:schemeClr>
+              </a:solidFill>
+            </a:endParaRPr>
+          </a:p>
+        </p:txBody>
+      </p:sp>
+      <p:pic>
+        <p:nvPicPr>
+          <p:cNvPr id="28" name="Graphic 27" descr="Aeroplane">
+            <a:extLst>
+              <a:ext uri="{FF2B5EF4-FFF2-40B4-BE49-F238E27FC236}">
+                <a16:creationId xmlns:a16="http://schemas.microsoft.com/office/drawing/2014/main" id="{960664AF-125E-6841-AD9D-9A76D1A33F2F}"/>
+              </a:ext>
+            </a:extLst>
+          </p:cNvPr>
+          <p:cNvPicPr>
+            <a:picLocks noChangeAspect="1"/>
+          </p:cNvPicPr>
+          <p:nvPr/>
+        </p:nvPicPr>
+        <p:blipFill>
+          <a:blip r:embed="rId4">
+            <a:extLst>
+              <a:ext uri="{96DAC541-7B7A-43D3-8B79-37D633B846F1}">
+                <asvg:svgBlip xmlns:asvg="http://schemas.microsoft.com/office/drawing/2016/SVG/main" r:embed="rId5"/>
+              </a:ext>
+            </a:extLst>
+          </a:blip>
+          <a:stretch>
+            <a:fillRect/>
+          </a:stretch>
+        </p:blipFill>
+        <p:spPr>
+          <a:xfrm rot="16200000">
+            <a:off x="2625774" y="3483541"/>
+            <a:ext cx="434106" cy="434106"/>
+          </a:xfrm>
+          <a:prstGeom prst="rect">
+            <a:avLst/>
+          </a:prstGeom>
+        </p:spPr>
+      </p:pic>
+      <p:pic>
+        <p:nvPicPr>
+          <p:cNvPr id="29" name="Graphic 28" descr="Aeroplane">
+            <a:extLst>
+              <a:ext uri="{FF2B5EF4-FFF2-40B4-BE49-F238E27FC236}">
+                <a16:creationId xmlns:a16="http://schemas.microsoft.com/office/drawing/2014/main" id="{ABB57CD8-A5DD-734D-AAD9-142743208A21}"/>
+              </a:ext>
+            </a:extLst>
+          </p:cNvPr>
+          <p:cNvPicPr>
+            <a:picLocks noChangeAspect="1"/>
+          </p:cNvPicPr>
+          <p:nvPr/>
+        </p:nvPicPr>
+        <p:blipFill>
+          <a:blip r:embed="rId6">
+            <a:extLst>
+              <a:ext uri="{96DAC541-7B7A-43D3-8B79-37D633B846F1}">
+                <asvg:svgBlip xmlns:asvg="http://schemas.microsoft.com/office/drawing/2016/SVG/main" r:embed="rId7"/>
+              </a:ext>
+            </a:extLst>
+          </a:blip>
+          <a:stretch>
+            <a:fillRect/>
+          </a:stretch>
+        </p:blipFill>
+        <p:spPr>
+          <a:xfrm rot="16200000">
+            <a:off x="2623499" y="3080933"/>
+            <a:ext cx="434106" cy="434106"/>
+          </a:xfrm>
+          <a:prstGeom prst="rect">
+            <a:avLst/>
+          </a:prstGeom>
+        </p:spPr>
+      </p:pic>
+    </p:spTree>
+    <p:extLst>
+      <p:ext uri="{BB962C8B-B14F-4D97-AF65-F5344CB8AC3E}">
+        <p14:creationId xmlns:p14="http://schemas.microsoft.com/office/powerpoint/2010/main" val="3326032169"/>
       </p:ext>
     </p:extLst>
   </p:cSld>

</xml_diff>

<commit_message>
Documentation updates especially around the Remote functionality, #22
</commit_message>
<xml_diff>
--- a/docs/XPMP2 Remote Architecture.pptx
+++ b/docs/XPMP2 Remote Architecture.pptx
@@ -8,8 +8,9 @@
     <p:sldId id="256" r:id="rId2"/>
     <p:sldId id="259" r:id="rId3"/>
     <p:sldId id="257" r:id="rId4"/>
-    <p:sldId id="260" r:id="rId5"/>
-    <p:sldId id="261" r:id="rId6"/>
+    <p:sldId id="262" r:id="rId5"/>
+    <p:sldId id="260" r:id="rId6"/>
+    <p:sldId id="261" r:id="rId7"/>
   </p:sldIdLst>
   <p:sldSz cx="12192000" cy="6858000"/>
   <p:notesSz cx="6858000" cy="9144000"/>
@@ -276,7 +277,7 @@
           <a:p>
             <a:fld id="{10EC4C2E-EC84-AC41-A50A-0694F464D93B}" type="datetimeFigureOut">
               <a:rPr lang="de-DE" smtClean="0"/>
-              <a:t>18.11.20</a:t>
+              <a:t>28.11.20</a:t>
             </a:fld>
             <a:endParaRPr lang="de-DE"/>
           </a:p>
@@ -476,7 +477,7 @@
           <a:p>
             <a:fld id="{10EC4C2E-EC84-AC41-A50A-0694F464D93B}" type="datetimeFigureOut">
               <a:rPr lang="de-DE" smtClean="0"/>
-              <a:t>18.11.20</a:t>
+              <a:t>28.11.20</a:t>
             </a:fld>
             <a:endParaRPr lang="de-DE"/>
           </a:p>
@@ -686,7 +687,7 @@
           <a:p>
             <a:fld id="{10EC4C2E-EC84-AC41-A50A-0694F464D93B}" type="datetimeFigureOut">
               <a:rPr lang="de-DE" smtClean="0"/>
-              <a:t>18.11.20</a:t>
+              <a:t>28.11.20</a:t>
             </a:fld>
             <a:endParaRPr lang="de-DE"/>
           </a:p>
@@ -886,7 +887,7 @@
           <a:p>
             <a:fld id="{10EC4C2E-EC84-AC41-A50A-0694F464D93B}" type="datetimeFigureOut">
               <a:rPr lang="de-DE" smtClean="0"/>
-              <a:t>18.11.20</a:t>
+              <a:t>28.11.20</a:t>
             </a:fld>
             <a:endParaRPr lang="de-DE"/>
           </a:p>
@@ -1162,7 +1163,7 @@
           <a:p>
             <a:fld id="{10EC4C2E-EC84-AC41-A50A-0694F464D93B}" type="datetimeFigureOut">
               <a:rPr lang="de-DE" smtClean="0"/>
-              <a:t>18.11.20</a:t>
+              <a:t>28.11.20</a:t>
             </a:fld>
             <a:endParaRPr lang="de-DE"/>
           </a:p>
@@ -1430,7 +1431,7 @@
           <a:p>
             <a:fld id="{10EC4C2E-EC84-AC41-A50A-0694F464D93B}" type="datetimeFigureOut">
               <a:rPr lang="de-DE" smtClean="0"/>
-              <a:t>18.11.20</a:t>
+              <a:t>28.11.20</a:t>
             </a:fld>
             <a:endParaRPr lang="de-DE"/>
           </a:p>
@@ -1845,7 +1846,7 @@
           <a:p>
             <a:fld id="{10EC4C2E-EC84-AC41-A50A-0694F464D93B}" type="datetimeFigureOut">
               <a:rPr lang="de-DE" smtClean="0"/>
-              <a:t>18.11.20</a:t>
+              <a:t>28.11.20</a:t>
             </a:fld>
             <a:endParaRPr lang="de-DE"/>
           </a:p>
@@ -1987,7 +1988,7 @@
           <a:p>
             <a:fld id="{10EC4C2E-EC84-AC41-A50A-0694F464D93B}" type="datetimeFigureOut">
               <a:rPr lang="de-DE" smtClean="0"/>
-              <a:t>18.11.20</a:t>
+              <a:t>28.11.20</a:t>
             </a:fld>
             <a:endParaRPr lang="de-DE"/>
           </a:p>
@@ -2100,7 +2101,7 @@
           <a:p>
             <a:fld id="{10EC4C2E-EC84-AC41-A50A-0694F464D93B}" type="datetimeFigureOut">
               <a:rPr lang="de-DE" smtClean="0"/>
-              <a:t>18.11.20</a:t>
+              <a:t>28.11.20</a:t>
             </a:fld>
             <a:endParaRPr lang="de-DE"/>
           </a:p>
@@ -2413,7 +2414,7 @@
           <a:p>
             <a:fld id="{10EC4C2E-EC84-AC41-A50A-0694F464D93B}" type="datetimeFigureOut">
               <a:rPr lang="de-DE" smtClean="0"/>
-              <a:t>18.11.20</a:t>
+              <a:t>28.11.20</a:t>
             </a:fld>
             <a:endParaRPr lang="de-DE"/>
           </a:p>
@@ -2702,7 +2703,7 @@
           <a:p>
             <a:fld id="{10EC4C2E-EC84-AC41-A50A-0694F464D93B}" type="datetimeFigureOut">
               <a:rPr lang="de-DE" smtClean="0"/>
-              <a:t>18.11.20</a:t>
+              <a:t>28.11.20</a:t>
             </a:fld>
             <a:endParaRPr lang="de-DE"/>
           </a:p>
@@ -2945,7 +2946,7 @@
           <a:p>
             <a:fld id="{10EC4C2E-EC84-AC41-A50A-0694F464D93B}" type="datetimeFigureOut">
               <a:rPr lang="de-DE" smtClean="0"/>
-              <a:t>18.11.20</a:t>
+              <a:t>28.11.20</a:t>
             </a:fld>
             <a:endParaRPr lang="de-DE"/>
           </a:p>
@@ -11650,7 +11651,7 @@
         </p:blipFill>
         <p:spPr>
           <a:xfrm>
-            <a:off x="4493142" y="207335"/>
+            <a:off x="4493142" y="2980316"/>
             <a:ext cx="2291316" cy="2291316"/>
           </a:xfrm>
           <a:prstGeom prst="rect">
@@ -11686,7 +11687,7 @@
         </p:blipFill>
         <p:spPr>
           <a:xfrm>
-            <a:off x="7361275" y="207335"/>
+            <a:off x="7361275" y="2980316"/>
             <a:ext cx="2291316" cy="2291316"/>
           </a:xfrm>
           <a:prstGeom prst="rect">
@@ -11722,7 +11723,7 @@
         </p:blipFill>
         <p:spPr>
           <a:xfrm>
-            <a:off x="1625009" y="207335"/>
+            <a:off x="1625009" y="2980316"/>
             <a:ext cx="2291316" cy="2291316"/>
           </a:xfrm>
           <a:prstGeom prst="rect">
@@ -11744,7 +11745,7 @@
         </p:nvCxnSpPr>
         <p:spPr>
           <a:xfrm>
-            <a:off x="871870" y="2498651"/>
+            <a:off x="871870" y="5271632"/>
             <a:ext cx="9357538" cy="0"/>
           </a:xfrm>
           <a:prstGeom prst="line">
@@ -11785,7 +11786,7 @@
         </p:nvCxnSpPr>
         <p:spPr>
           <a:xfrm>
-            <a:off x="6420034" y="2048022"/>
+            <a:off x="6420034" y="4821003"/>
             <a:ext cx="0" cy="425302"/>
           </a:xfrm>
           <a:prstGeom prst="line">
@@ -11827,7 +11828,7 @@
         </p:nvCxnSpPr>
         <p:spPr>
           <a:xfrm>
-            <a:off x="3522921" y="2073349"/>
+            <a:off x="3522921" y="4846330"/>
             <a:ext cx="0" cy="425302"/>
           </a:xfrm>
           <a:prstGeom prst="line">
@@ -11870,7 +11871,7 @@
         </p:nvCxnSpPr>
         <p:spPr>
           <a:xfrm>
-            <a:off x="9278679" y="2073349"/>
+            <a:off x="9278679" y="4846330"/>
             <a:ext cx="0" cy="425302"/>
           </a:xfrm>
           <a:prstGeom prst="line">
@@ -11913,7 +11914,7 @@
         </p:nvSpPr>
         <p:spPr>
           <a:xfrm>
-            <a:off x="3470274" y="2473324"/>
+            <a:off x="3470274" y="5246305"/>
             <a:ext cx="107951" cy="45719"/>
           </a:xfrm>
           <a:prstGeom prst="roundRect">
@@ -11967,7 +11968,7 @@
         </p:nvSpPr>
         <p:spPr>
           <a:xfrm>
-            <a:off x="6374476" y="2473324"/>
+            <a:off x="6374476" y="5246305"/>
             <a:ext cx="107951" cy="45719"/>
           </a:xfrm>
           <a:prstGeom prst="roundRect">
@@ -12021,7 +12022,7 @@
         </p:nvSpPr>
         <p:spPr>
           <a:xfrm>
-            <a:off x="9224702" y="2473324"/>
+            <a:off x="9224702" y="5246305"/>
             <a:ext cx="107951" cy="45719"/>
           </a:xfrm>
           <a:prstGeom prst="roundRect">
@@ -12075,7 +12076,7 @@
         </p:nvSpPr>
         <p:spPr>
           <a:xfrm>
-            <a:off x="4795284" y="207335"/>
+            <a:off x="4795284" y="2980316"/>
             <a:ext cx="837280" cy="338554"/>
           </a:xfrm>
           <a:prstGeom prst="rect">
@@ -12116,7 +12117,7 @@
         </p:nvSpPr>
         <p:spPr>
           <a:xfrm>
-            <a:off x="1520487" y="207335"/>
+            <a:off x="1520487" y="2980316"/>
             <a:ext cx="1663084" cy="338554"/>
           </a:xfrm>
           <a:prstGeom prst="rect">
@@ -12199,7 +12200,7 @@
         </p:blipFill>
         <p:spPr>
           <a:xfrm rot="16200000">
-            <a:off x="5004261" y="1242054"/>
+            <a:off x="5004261" y="4015035"/>
             <a:ext cx="434106" cy="434106"/>
           </a:xfrm>
           <a:prstGeom prst="rect">
@@ -12221,7 +12222,7 @@
         </p:nvSpPr>
         <p:spPr>
           <a:xfrm>
-            <a:off x="7669569" y="207335"/>
+            <a:off x="7669569" y="2980316"/>
             <a:ext cx="1663084" cy="338554"/>
           </a:xfrm>
           <a:prstGeom prst="rect">
@@ -12290,7 +12291,7 @@
         </p:nvSpPr>
         <p:spPr>
           <a:xfrm>
-            <a:off x="4669464" y="1029826"/>
+            <a:off x="4669464" y="3802807"/>
             <a:ext cx="1113575" cy="338554"/>
           </a:xfrm>
           <a:prstGeom prst="rect">
@@ -12339,7 +12340,7 @@
         </p:nvSpPr>
         <p:spPr>
           <a:xfrm>
-            <a:off x="1846982" y="875938"/>
+            <a:off x="1846982" y="3648919"/>
             <a:ext cx="1010093" cy="646331"/>
           </a:xfrm>
           <a:prstGeom prst="rect">
@@ -12381,7 +12382,7 @@
         </p:nvSpPr>
         <p:spPr>
           <a:xfrm>
-            <a:off x="7581475" y="875938"/>
+            <a:off x="7581475" y="3648919"/>
             <a:ext cx="1010093" cy="646331"/>
           </a:xfrm>
           <a:prstGeom prst="rect">
@@ -12436,7 +12437,7 @@
         </p:blipFill>
         <p:spPr>
           <a:xfrm rot="16200000">
-            <a:off x="2553717" y="1299445"/>
+            <a:off x="2553717" y="4072426"/>
             <a:ext cx="434106" cy="255202"/>
           </a:xfrm>
           <a:prstGeom prst="rect">
@@ -12471,7 +12472,7 @@
         </p:blipFill>
         <p:spPr>
           <a:xfrm rot="16200000">
-            <a:off x="7449138" y="1306807"/>
+            <a:off x="7449138" y="4079788"/>
             <a:ext cx="434106" cy="187268"/>
           </a:xfrm>
           <a:prstGeom prst="rect">
@@ -12479,6 +12480,159 @@
           </a:prstGeom>
         </p:spPr>
       </p:pic>
+      <p:pic>
+        <p:nvPicPr>
+          <p:cNvPr id="56" name="Picture 55">
+            <a:extLst>
+              <a:ext uri="{FF2B5EF4-FFF2-40B4-BE49-F238E27FC236}">
+                <a16:creationId xmlns:a16="http://schemas.microsoft.com/office/drawing/2014/main" id="{36DB9603-C796-B140-BC7A-AB2FB6FD9884}"/>
+              </a:ext>
+            </a:extLst>
+          </p:cNvPr>
+          <p:cNvPicPr>
+            <a:picLocks noChangeAspect="1"/>
+          </p:cNvPicPr>
+          <p:nvPr/>
+        </p:nvPicPr>
+        <p:blipFill>
+          <a:blip r:embed="rId8"/>
+          <a:stretch>
+            <a:fillRect/>
+          </a:stretch>
+        </p:blipFill>
+        <p:spPr>
+          <a:xfrm>
+            <a:off x="871870" y="4665587"/>
+            <a:ext cx="582990" cy="582990"/>
+          </a:xfrm>
+          <a:prstGeom prst="rect">
+            <a:avLst/>
+          </a:prstGeom>
+        </p:spPr>
+      </p:pic>
+      <p:sp>
+        <p:nvSpPr>
+          <p:cNvPr id="47" name="TextBox 46">
+            <a:extLst>
+              <a:ext uri="{FF2B5EF4-FFF2-40B4-BE49-F238E27FC236}">
+                <a16:creationId xmlns:a16="http://schemas.microsoft.com/office/drawing/2014/main" id="{9222A64C-126A-3E4D-A5CB-406BBDB564BB}"/>
+              </a:ext>
+            </a:extLst>
+          </p:cNvPr>
+          <p:cNvSpPr txBox="1"/>
+          <p:nvPr/>
+        </p:nvSpPr>
+        <p:spPr>
+          <a:xfrm>
+            <a:off x="871870" y="2176112"/>
+            <a:ext cx="3752117" cy="646331"/>
+          </a:xfrm>
+          <a:prstGeom prst="rect">
+            <a:avLst/>
+          </a:prstGeom>
+          <a:noFill/>
+        </p:spPr>
+        <p:txBody>
+          <a:bodyPr wrap="none" rtlCol="0">
+            <a:spAutoFit/>
+          </a:bodyPr>
+          <a:lstStyle/>
+          <a:p>
+            <a:r>
+              <a:rPr lang="de-DE" dirty="0">
+                <a:solidFill>
+                  <a:schemeClr val="accent1">
+                    <a:lumMod val="75000"/>
+                  </a:schemeClr>
+                </a:solidFill>
+              </a:rPr>
+              <a:t>Standard Setup: Senders on Master,</a:t>
+            </a:r>
+          </a:p>
+          <a:p>
+            <a:r>
+              <a:rPr lang="de-DE" dirty="0">
+                <a:solidFill>
+                  <a:schemeClr val="accent1">
+                    <a:lumMod val="75000"/>
+                  </a:schemeClr>
+                </a:solidFill>
+              </a:rPr>
+              <a:t>Remote Clients on all </a:t>
+            </a:r>
+            <a:r>
+              <a:rPr lang="de-DE" dirty="0" err="1">
+                <a:solidFill>
+                  <a:schemeClr val="accent1">
+                    <a:lumMod val="75000"/>
+                  </a:schemeClr>
+                </a:solidFill>
+              </a:rPr>
+              <a:t>External</a:t>
+            </a:r>
+            <a:r>
+              <a:rPr lang="de-DE" dirty="0">
+                <a:solidFill>
+                  <a:schemeClr val="accent1">
+                    <a:lumMod val="75000"/>
+                  </a:schemeClr>
+                </a:solidFill>
+              </a:rPr>
+              <a:t> </a:t>
+            </a:r>
+            <a:r>
+              <a:rPr lang="de-DE" dirty="0" err="1">
+                <a:solidFill>
+                  <a:schemeClr val="accent1">
+                    <a:lumMod val="75000"/>
+                  </a:schemeClr>
+                </a:solidFill>
+              </a:rPr>
+              <a:t>Visuals</a:t>
+            </a:r>
+            <a:r>
+              <a:rPr lang="de-DE" dirty="0">
+                <a:solidFill>
+                  <a:schemeClr val="accent1">
+                    <a:lumMod val="75000"/>
+                  </a:schemeClr>
+                </a:solidFill>
+              </a:rPr>
+              <a:t>:</a:t>
+            </a:r>
+          </a:p>
+        </p:txBody>
+      </p:sp>
+    </p:spTree>
+    <p:extLst>
+      <p:ext uri="{BB962C8B-B14F-4D97-AF65-F5344CB8AC3E}">
+        <p14:creationId xmlns:p14="http://schemas.microsoft.com/office/powerpoint/2010/main" val="822513609"/>
+      </p:ext>
+    </p:extLst>
+  </p:cSld>
+  <p:clrMapOvr>
+    <a:masterClrMapping/>
+  </p:clrMapOvr>
+</p:sld>
+</file>
+
+<file path=ppt/slides/slide4.xml><?xml version="1.0" encoding="utf-8"?>
+<p:sld xmlns:a="http://schemas.openxmlformats.org/drawingml/2006/main" xmlns:r="http://schemas.openxmlformats.org/officeDocument/2006/relationships" xmlns:p="http://schemas.openxmlformats.org/presentationml/2006/main">
+  <p:cSld>
+    <p:spTree>
+      <p:nvGrpSpPr>
+        <p:cNvPr id="1" name=""/>
+        <p:cNvGrpSpPr/>
+        <p:nvPr/>
+      </p:nvGrpSpPr>
+      <p:grpSpPr>
+        <a:xfrm>
+          <a:off x="0" y="0"/>
+          <a:ext cx="0" cy="0"/>
+          <a:chOff x="0" y="0"/>
+          <a:chExt cx="0" cy="0"/>
+        </a:xfrm>
+      </p:grpSpPr>
       <p:pic>
         <p:nvPicPr>
           <p:cNvPr id="33" name="Graphic 32" descr="Computer">
@@ -13501,10 +13655,123 @@
           </a:prstGeom>
         </p:spPr>
       </p:pic>
+      <p:sp>
+        <p:nvSpPr>
+          <p:cNvPr id="47" name="TextBox 46">
+            <a:extLst>
+              <a:ext uri="{FF2B5EF4-FFF2-40B4-BE49-F238E27FC236}">
+                <a16:creationId xmlns:a16="http://schemas.microsoft.com/office/drawing/2014/main" id="{41BDA7EC-7435-E44C-8B43-0A2875D08BF8}"/>
+              </a:ext>
+            </a:extLst>
+          </p:cNvPr>
+          <p:cNvSpPr txBox="1"/>
+          <p:nvPr/>
+        </p:nvSpPr>
+        <p:spPr>
+          <a:xfrm>
+            <a:off x="871870" y="2176112"/>
+            <a:ext cx="3852914" cy="646331"/>
+          </a:xfrm>
+          <a:prstGeom prst="rect">
+            <a:avLst/>
+          </a:prstGeom>
+          <a:noFill/>
+        </p:spPr>
+        <p:txBody>
+          <a:bodyPr wrap="none" rtlCol="0">
+            <a:spAutoFit/>
+          </a:bodyPr>
+          <a:lstStyle/>
+          <a:p>
+            <a:r>
+              <a:rPr lang="de-DE" dirty="0">
+                <a:solidFill>
+                  <a:schemeClr val="accent1">
+                    <a:lumMod val="75000"/>
+                  </a:schemeClr>
+                </a:solidFill>
+              </a:rPr>
+              <a:t>Senders on an </a:t>
+            </a:r>
+            <a:r>
+              <a:rPr lang="de-DE" dirty="0" err="1">
+                <a:solidFill>
+                  <a:schemeClr val="accent1">
+                    <a:lumMod val="75000"/>
+                  </a:schemeClr>
+                </a:solidFill>
+              </a:rPr>
+              <a:t>External</a:t>
+            </a:r>
+            <a:r>
+              <a:rPr lang="de-DE" dirty="0">
+                <a:solidFill>
+                  <a:schemeClr val="accent1">
+                    <a:lumMod val="75000"/>
+                  </a:schemeClr>
+                </a:solidFill>
+              </a:rPr>
+              <a:t> Visual,</a:t>
+            </a:r>
+          </a:p>
+          <a:p>
+            <a:r>
+              <a:rPr lang="de-DE" dirty="0">
+                <a:solidFill>
+                  <a:schemeClr val="accent1">
+                    <a:lumMod val="75000"/>
+                  </a:schemeClr>
+                </a:solidFill>
+              </a:rPr>
+              <a:t>Remote Clients on all </a:t>
+            </a:r>
+            <a:r>
+              <a:rPr lang="de-DE" dirty="0" err="1">
+                <a:solidFill>
+                  <a:schemeClr val="accent1">
+                    <a:lumMod val="75000"/>
+                  </a:schemeClr>
+                </a:solidFill>
+              </a:rPr>
+              <a:t>other</a:t>
+            </a:r>
+            <a:r>
+              <a:rPr lang="de-DE" dirty="0">
+                <a:solidFill>
+                  <a:schemeClr val="accent1">
+                    <a:lumMod val="75000"/>
+                  </a:schemeClr>
+                </a:solidFill>
+              </a:rPr>
+              <a:t> </a:t>
+            </a:r>
+            <a:r>
+              <a:rPr lang="de-DE" dirty="0" err="1">
+                <a:solidFill>
+                  <a:schemeClr val="accent1">
+                    <a:lumMod val="75000"/>
+                  </a:schemeClr>
+                </a:solidFill>
+              </a:rPr>
+              <a:t>computers</a:t>
+            </a:r>
+            <a:r>
+              <a:rPr lang="de-DE" dirty="0">
+                <a:solidFill>
+                  <a:schemeClr val="accent1">
+                    <a:lumMod val="75000"/>
+                  </a:schemeClr>
+                </a:solidFill>
+              </a:rPr>
+              <a:t>:</a:t>
+            </a:r>
+          </a:p>
+        </p:txBody>
+      </p:sp>
     </p:spTree>
     <p:extLst>
       <p:ext uri="{BB962C8B-B14F-4D97-AF65-F5344CB8AC3E}">
-        <p14:creationId xmlns:p14="http://schemas.microsoft.com/office/powerpoint/2010/main" val="822513609"/>
+        <p14:creationId xmlns:p14="http://schemas.microsoft.com/office/powerpoint/2010/main" val="687211219"/>
       </p:ext>
     </p:extLst>
   </p:cSld>
@@ -13514,7 +13781,7 @@
 </p:sld>
 </file>
 
-<file path=ppt/slides/slide4.xml><?xml version="1.0" encoding="utf-8"?>
+<file path=ppt/slides/slide5.xml><?xml version="1.0" encoding="utf-8"?>
 <p:sld xmlns:a="http://schemas.openxmlformats.org/drawingml/2006/main" xmlns:r="http://schemas.openxmlformats.org/officeDocument/2006/relationships" xmlns:p="http://schemas.openxmlformats.org/presentationml/2006/main">
   <p:cSld>
     <p:spTree>
@@ -14586,7 +14853,7 @@
         </p:nvSpPr>
         <p:spPr>
           <a:xfrm>
-            <a:off x="871870" y="1092748"/>
+            <a:off x="871870" y="2176112"/>
             <a:ext cx="6833024" cy="646331"/>
           </a:xfrm>
           <a:prstGeom prst="rect">
@@ -14651,7 +14918,7 @@
               <a:t> on </a:t>
             </a:r>
             <a:r>
-              <a:rPr lang="de-DE" dirty="0" err="1">
+              <a:rPr lang="de-DE" i="1" dirty="0" err="1">
                 <a:solidFill>
                   <a:schemeClr val="accent1">
                     <a:lumMod val="75000"/>
@@ -14918,7 +15185,7 @@
 </p:sld>
 </file>
 
-<file path=ppt/slides/slide5.xml><?xml version="1.0" encoding="utf-8"?>
+<file path=ppt/slides/slide6.xml><?xml version="1.0" encoding="utf-8"?>
 <p:sld xmlns:a="http://schemas.openxmlformats.org/drawingml/2006/main" xmlns:r="http://schemas.openxmlformats.org/officeDocument/2006/relationships" xmlns:p="http://schemas.openxmlformats.org/presentationml/2006/main">
   <p:cSld>
     <p:spTree>
@@ -14963,7 +15230,7 @@
         </p:blipFill>
         <p:spPr>
           <a:xfrm>
-            <a:off x="3269974" y="1759420"/>
+            <a:off x="3269974" y="2286194"/>
             <a:ext cx="3514484" cy="3514484"/>
           </a:xfrm>
           <a:prstGeom prst="rect">
@@ -14999,7 +15266,7 @@
         </p:blipFill>
         <p:spPr>
           <a:xfrm rot="16200000">
-            <a:off x="4248887" y="3325083"/>
+            <a:off x="4248887" y="3851857"/>
             <a:ext cx="434106" cy="434106"/>
           </a:xfrm>
           <a:prstGeom prst="rect">
@@ -15035,7 +15302,7 @@
         </p:blipFill>
         <p:spPr>
           <a:xfrm rot="16200000">
-            <a:off x="4246612" y="2922475"/>
+            <a:off x="4246612" y="3449249"/>
             <a:ext cx="434106" cy="434106"/>
           </a:xfrm>
           <a:prstGeom prst="rect">
@@ -15057,7 +15324,7 @@
         </p:nvSpPr>
         <p:spPr>
           <a:xfrm>
-            <a:off x="3667538" y="2627294"/>
+            <a:off x="3667538" y="3154068"/>
             <a:ext cx="1630018" cy="1290353"/>
           </a:xfrm>
           <a:prstGeom prst="rect">
@@ -15192,7 +15459,7 @@
         </p:nvSpPr>
         <p:spPr>
           <a:xfrm>
-            <a:off x="871870" y="1092748"/>
+            <a:off x="871870" y="1927633"/>
             <a:ext cx="9318513" cy="923330"/>
           </a:xfrm>
           <a:prstGeom prst="rect">
@@ -15757,7 +16024,7 @@
         </p:nvSpPr>
         <p:spPr>
           <a:xfrm>
-            <a:off x="1259831" y="2975605"/>
+            <a:off x="1259831" y="3502379"/>
             <a:ext cx="2027582" cy="1133061"/>
           </a:xfrm>
           <a:prstGeom prst="roundRect">
@@ -15865,7 +16132,7 @@
         </p:blipFill>
         <p:spPr>
           <a:xfrm rot="16200000">
-            <a:off x="2625774" y="3483541"/>
+            <a:off x="2625774" y="4010315"/>
             <a:ext cx="434106" cy="434106"/>
           </a:xfrm>
           <a:prstGeom prst="rect">
@@ -15901,7 +16168,7 @@
         </p:blipFill>
         <p:spPr>
           <a:xfrm rot="16200000">
-            <a:off x="2623499" y="3080933"/>
+            <a:off x="2623499" y="3607707"/>
             <a:ext cx="434106" cy="434106"/>
           </a:xfrm>
           <a:prstGeom prst="rect">

</xml_diff>